<commit_message>
Minor powerpoint modifications. Added visualization and rescaling to spatial fitting, rescaling still needs details fixed but runs
</commit_message>
<xml_diff>
--- a/Présentation.pptx
+++ b/Présentation.pptx
@@ -72,13 +72,13 @@
         </a:solidFill>
         <a:effectLst/>
         <a:uFillTx/>
-        <a:latin typeface="+mj-lt"/>
-        <a:ea typeface="+mj-ea"/>
-        <a:cs typeface="+mj-cs"/>
-        <a:sym typeface="Trebuchet MS"/>
+        <a:latin typeface="+mn-lt"/>
+        <a:ea typeface="+mn-ea"/>
+        <a:cs typeface="+mn-cs"/>
+        <a:sym typeface="Helvetica"/>
       </a:defRPr>
     </a:lvl1pPr>
-    <a:lvl2pPr marL="0" marR="0" indent="457200" algn="l" defTabSz="457200" rtl="0" fontAlgn="auto" latinLnBrk="0" hangingPunct="0">
+    <a:lvl2pPr marL="0" marR="0" indent="0" algn="l" defTabSz="457200" rtl="0" fontAlgn="auto" latinLnBrk="0" hangingPunct="0">
       <a:lnSpc>
         <a:spcPct val="100000"/>
       </a:lnSpc>
@@ -102,13 +102,13 @@
         </a:solidFill>
         <a:effectLst/>
         <a:uFillTx/>
-        <a:latin typeface="+mj-lt"/>
-        <a:ea typeface="+mj-ea"/>
-        <a:cs typeface="+mj-cs"/>
-        <a:sym typeface="Trebuchet MS"/>
+        <a:latin typeface="+mn-lt"/>
+        <a:ea typeface="+mn-ea"/>
+        <a:cs typeface="+mn-cs"/>
+        <a:sym typeface="Helvetica"/>
       </a:defRPr>
     </a:lvl2pPr>
-    <a:lvl3pPr marL="0" marR="0" indent="914400" algn="l" defTabSz="457200" rtl="0" fontAlgn="auto" latinLnBrk="0" hangingPunct="0">
+    <a:lvl3pPr marL="0" marR="0" indent="0" algn="l" defTabSz="457200" rtl="0" fontAlgn="auto" latinLnBrk="0" hangingPunct="0">
       <a:lnSpc>
         <a:spcPct val="100000"/>
       </a:lnSpc>
@@ -132,13 +132,13 @@
         </a:solidFill>
         <a:effectLst/>
         <a:uFillTx/>
-        <a:latin typeface="+mj-lt"/>
-        <a:ea typeface="+mj-ea"/>
-        <a:cs typeface="+mj-cs"/>
-        <a:sym typeface="Trebuchet MS"/>
+        <a:latin typeface="+mn-lt"/>
+        <a:ea typeface="+mn-ea"/>
+        <a:cs typeface="+mn-cs"/>
+        <a:sym typeface="Helvetica"/>
       </a:defRPr>
     </a:lvl3pPr>
-    <a:lvl4pPr marL="0" marR="0" indent="1371600" algn="l" defTabSz="457200" rtl="0" fontAlgn="auto" latinLnBrk="0" hangingPunct="0">
+    <a:lvl4pPr marL="0" marR="0" indent="0" algn="l" defTabSz="457200" rtl="0" fontAlgn="auto" latinLnBrk="0" hangingPunct="0">
       <a:lnSpc>
         <a:spcPct val="100000"/>
       </a:lnSpc>
@@ -162,13 +162,13 @@
         </a:solidFill>
         <a:effectLst/>
         <a:uFillTx/>
-        <a:latin typeface="+mj-lt"/>
-        <a:ea typeface="+mj-ea"/>
-        <a:cs typeface="+mj-cs"/>
-        <a:sym typeface="Trebuchet MS"/>
+        <a:latin typeface="+mn-lt"/>
+        <a:ea typeface="+mn-ea"/>
+        <a:cs typeface="+mn-cs"/>
+        <a:sym typeface="Helvetica"/>
       </a:defRPr>
     </a:lvl4pPr>
-    <a:lvl5pPr marL="0" marR="0" indent="1828800" algn="l" defTabSz="457200" rtl="0" fontAlgn="auto" latinLnBrk="0" hangingPunct="0">
+    <a:lvl5pPr marL="0" marR="0" indent="0" algn="l" defTabSz="457200" rtl="0" fontAlgn="auto" latinLnBrk="0" hangingPunct="0">
       <a:lnSpc>
         <a:spcPct val="100000"/>
       </a:lnSpc>
@@ -192,13 +192,13 @@
         </a:solidFill>
         <a:effectLst/>
         <a:uFillTx/>
-        <a:latin typeface="+mj-lt"/>
-        <a:ea typeface="+mj-ea"/>
-        <a:cs typeface="+mj-cs"/>
-        <a:sym typeface="Trebuchet MS"/>
+        <a:latin typeface="+mn-lt"/>
+        <a:ea typeface="+mn-ea"/>
+        <a:cs typeface="+mn-cs"/>
+        <a:sym typeface="Helvetica"/>
       </a:defRPr>
     </a:lvl5pPr>
-    <a:lvl6pPr marL="0" marR="0" indent="2286000" algn="l" defTabSz="457200" rtl="0" fontAlgn="auto" latinLnBrk="0" hangingPunct="0">
+    <a:lvl6pPr marL="0" marR="0" indent="0" algn="l" defTabSz="457200" rtl="0" fontAlgn="auto" latinLnBrk="0" hangingPunct="0">
       <a:lnSpc>
         <a:spcPct val="100000"/>
       </a:lnSpc>
@@ -222,13 +222,13 @@
         </a:solidFill>
         <a:effectLst/>
         <a:uFillTx/>
-        <a:latin typeface="+mj-lt"/>
-        <a:ea typeface="+mj-ea"/>
-        <a:cs typeface="+mj-cs"/>
-        <a:sym typeface="Trebuchet MS"/>
+        <a:latin typeface="+mn-lt"/>
+        <a:ea typeface="+mn-ea"/>
+        <a:cs typeface="+mn-cs"/>
+        <a:sym typeface="Helvetica"/>
       </a:defRPr>
     </a:lvl6pPr>
-    <a:lvl7pPr marL="0" marR="0" indent="2743200" algn="l" defTabSz="457200" rtl="0" fontAlgn="auto" latinLnBrk="0" hangingPunct="0">
+    <a:lvl7pPr marL="0" marR="0" indent="0" algn="l" defTabSz="457200" rtl="0" fontAlgn="auto" latinLnBrk="0" hangingPunct="0">
       <a:lnSpc>
         <a:spcPct val="100000"/>
       </a:lnSpc>
@@ -252,13 +252,13 @@
         </a:solidFill>
         <a:effectLst/>
         <a:uFillTx/>
-        <a:latin typeface="+mj-lt"/>
-        <a:ea typeface="+mj-ea"/>
-        <a:cs typeface="+mj-cs"/>
-        <a:sym typeface="Trebuchet MS"/>
+        <a:latin typeface="+mn-lt"/>
+        <a:ea typeface="+mn-ea"/>
+        <a:cs typeface="+mn-cs"/>
+        <a:sym typeface="Helvetica"/>
       </a:defRPr>
     </a:lvl7pPr>
-    <a:lvl8pPr marL="0" marR="0" indent="3200400" algn="l" defTabSz="457200" rtl="0" fontAlgn="auto" latinLnBrk="0" hangingPunct="0">
+    <a:lvl8pPr marL="0" marR="0" indent="0" algn="l" defTabSz="457200" rtl="0" fontAlgn="auto" latinLnBrk="0" hangingPunct="0">
       <a:lnSpc>
         <a:spcPct val="100000"/>
       </a:lnSpc>
@@ -282,13 +282,13 @@
         </a:solidFill>
         <a:effectLst/>
         <a:uFillTx/>
-        <a:latin typeface="+mj-lt"/>
-        <a:ea typeface="+mj-ea"/>
-        <a:cs typeface="+mj-cs"/>
-        <a:sym typeface="Trebuchet MS"/>
+        <a:latin typeface="+mn-lt"/>
+        <a:ea typeface="+mn-ea"/>
+        <a:cs typeface="+mn-cs"/>
+        <a:sym typeface="Helvetica"/>
       </a:defRPr>
     </a:lvl8pPr>
-    <a:lvl9pPr marL="0" marR="0" indent="3657600" algn="l" defTabSz="457200" rtl="0" fontAlgn="auto" latinLnBrk="0" hangingPunct="0">
+    <a:lvl9pPr marL="0" marR="0" indent="0" algn="l" defTabSz="457200" rtl="0" fontAlgn="auto" latinLnBrk="0" hangingPunct="0">
       <a:lnSpc>
         <a:spcPct val="100000"/>
       </a:lnSpc>
@@ -312,10 +312,10 @@
         </a:solidFill>
         <a:effectLst/>
         <a:uFillTx/>
-        <a:latin typeface="+mj-lt"/>
-        <a:ea typeface="+mj-ea"/>
-        <a:cs typeface="+mj-cs"/>
-        <a:sym typeface="Trebuchet MS"/>
+        <a:latin typeface="+mn-lt"/>
+        <a:ea typeface="+mn-ea"/>
+        <a:cs typeface="+mn-cs"/>
+        <a:sym typeface="Helvetica"/>
       </a:defRPr>
     </a:lvl9pPr>
   </p:defaultTextStyle>
@@ -498,10 +498,10 @@
         </p:nvGrpSpPr>
         <p:grpSpPr>
           <a:xfrm>
-            <a:off x="-1" y="-8468"/>
-            <a:ext cx="12192002" cy="6866469"/>
-            <a:chOff x="0" y="0"/>
-            <a:chExt cx="12192000" cy="6866467"/>
+            <a:off x="-3" y="-8469"/>
+            <a:ext cx="12192006" cy="6866472"/>
+            <a:chOff x="-1" y="0"/>
+            <a:chExt cx="12192004" cy="6866470"/>
           </a:xfrm>
         </p:grpSpPr>
         <p:sp>
@@ -512,8 +512,8 @@
           </p:nvSpPr>
           <p:spPr>
             <a:xfrm>
-              <a:off x="-1" y="605"/>
-              <a:ext cx="863601" cy="5698068"/>
+              <a:off x="-2" y="605"/>
+              <a:ext cx="863603" cy="5698070"/>
             </a:xfrm>
             <a:custGeom>
               <a:avLst/>
@@ -567,12 +567,19 @@
             <a:effectLst/>
           </p:spPr>
           <p:txBody>
-            <a:bodyPr wrap="square" lIns="45719" tIns="45719" rIns="45719" bIns="45719" numCol="1" anchor="t">
+            <a:bodyPr wrap="square" lIns="45718" tIns="45718" rIns="45718" bIns="45718" numCol="1" anchor="t">
               <a:noAutofit/>
             </a:bodyPr>
             <a:lstStyle/>
             <a:p>
-              <a:pPr/>
+              <a:pPr>
+                <a:defRPr>
+                  <a:latin typeface="+mj-lt"/>
+                  <a:ea typeface="+mj-ea"/>
+                  <a:cs typeface="+mj-cs"/>
+                  <a:sym typeface="Trebuchet MS"/>
+                </a:defRPr>
+              </a:pPr>
             </a:p>
           </p:txBody>
         </p:sp>
@@ -584,8 +591,8 @@
           </p:nvSpPr>
           <p:spPr>
             <a:xfrm>
-              <a:off x="9371012" y="8466"/>
-              <a:ext cx="1219201" cy="6858002"/>
+              <a:off x="9371013" y="8466"/>
+              <a:ext cx="1219202" cy="6858005"/>
             </a:xfrm>
             <a:prstGeom prst="line">
               <a:avLst/>
@@ -603,7 +610,7 @@
             <a:effectLst/>
           </p:spPr>
           <p:txBody>
-            <a:bodyPr wrap="square" lIns="45719" tIns="45719" rIns="45719" bIns="45719" numCol="1" anchor="t">
+            <a:bodyPr wrap="square" lIns="45718" tIns="45718" rIns="45718" bIns="45718" numCol="1" anchor="t">
               <a:noAutofit/>
             </a:bodyPr>
             <a:lstStyle/>
@@ -620,8 +627,8 @@
           </p:nvSpPr>
           <p:spPr>
             <a:xfrm flipH="1">
-              <a:off x="7425267" y="3689879"/>
-              <a:ext cx="4763559" cy="3176588"/>
+              <a:off x="7425268" y="3689880"/>
+              <a:ext cx="4763561" cy="3176589"/>
             </a:xfrm>
             <a:prstGeom prst="line">
               <a:avLst/>
@@ -639,7 +646,7 @@
             <a:effectLst/>
           </p:spPr>
           <p:txBody>
-            <a:bodyPr wrap="square" lIns="45719" tIns="45719" rIns="45719" bIns="45719" numCol="1" anchor="t">
+            <a:bodyPr wrap="square" lIns="45718" tIns="45718" rIns="45718" bIns="45718" numCol="1" anchor="t">
               <a:noAutofit/>
             </a:bodyPr>
             <a:lstStyle/>
@@ -656,8 +663,8 @@
           </p:nvSpPr>
           <p:spPr>
             <a:xfrm>
-              <a:off x="9181476" y="0"/>
-              <a:ext cx="3007350" cy="6866468"/>
+              <a:off x="9181477" y="-1"/>
+              <a:ext cx="3007352" cy="6866471"/>
             </a:xfrm>
             <a:custGeom>
               <a:avLst/>
@@ -711,12 +718,19 @@
             <a:effectLst/>
           </p:spPr>
           <p:txBody>
-            <a:bodyPr wrap="square" lIns="45719" tIns="45719" rIns="45719" bIns="45719" numCol="1" anchor="t">
+            <a:bodyPr wrap="square" lIns="45718" tIns="45718" rIns="45718" bIns="45718" numCol="1" anchor="t">
               <a:noAutofit/>
             </a:bodyPr>
             <a:lstStyle/>
             <a:p>
-              <a:pPr/>
+              <a:pPr>
+                <a:defRPr>
+                  <a:latin typeface="+mj-lt"/>
+                  <a:ea typeface="+mj-ea"/>
+                  <a:cs typeface="+mj-cs"/>
+                  <a:sym typeface="Trebuchet MS"/>
+                </a:defRPr>
+              </a:pPr>
             </a:p>
           </p:txBody>
         </p:sp>
@@ -728,8 +742,8 @@
           </p:nvSpPr>
           <p:spPr>
             <a:xfrm>
-              <a:off x="9603441" y="0"/>
-              <a:ext cx="2588560" cy="6866468"/>
+              <a:off x="9603442" y="-1"/>
+              <a:ext cx="2588562" cy="6866471"/>
             </a:xfrm>
             <a:custGeom>
               <a:avLst/>
@@ -783,12 +797,19 @@
             <a:effectLst/>
           </p:spPr>
           <p:txBody>
-            <a:bodyPr wrap="square" lIns="45719" tIns="45719" rIns="45719" bIns="45719" numCol="1" anchor="t">
+            <a:bodyPr wrap="square" lIns="45718" tIns="45718" rIns="45718" bIns="45718" numCol="1" anchor="t">
               <a:noAutofit/>
             </a:bodyPr>
             <a:lstStyle/>
             <a:p>
-              <a:pPr/>
+              <a:pPr>
+                <a:defRPr>
+                  <a:latin typeface="+mj-lt"/>
+                  <a:ea typeface="+mj-ea"/>
+                  <a:cs typeface="+mj-cs"/>
+                  <a:sym typeface="Trebuchet MS"/>
+                </a:defRPr>
+              </a:pPr>
             </a:p>
           </p:txBody>
         </p:sp>
@@ -800,8 +821,8 @@
           </p:nvSpPr>
           <p:spPr>
             <a:xfrm>
-              <a:off x="8932333" y="3056466"/>
-              <a:ext cx="3259668" cy="3810002"/>
+              <a:off x="8932334" y="3056466"/>
+              <a:ext cx="3259670" cy="3810005"/>
             </a:xfrm>
             <a:custGeom>
               <a:avLst/>
@@ -849,12 +870,19 @@
             <a:effectLst/>
           </p:spPr>
           <p:txBody>
-            <a:bodyPr wrap="square" lIns="45719" tIns="45719" rIns="45719" bIns="45719" numCol="1" anchor="t">
+            <a:bodyPr wrap="square" lIns="45718" tIns="45718" rIns="45718" bIns="45718" numCol="1" anchor="t">
               <a:noAutofit/>
             </a:bodyPr>
             <a:lstStyle/>
             <a:p>
-              <a:pPr/>
+              <a:pPr>
+                <a:defRPr>
+                  <a:latin typeface="+mj-lt"/>
+                  <a:ea typeface="+mj-ea"/>
+                  <a:cs typeface="+mj-cs"/>
+                  <a:sym typeface="Trebuchet MS"/>
+                </a:defRPr>
+              </a:pPr>
             </a:p>
           </p:txBody>
         </p:sp>
@@ -866,8 +894,8 @@
           </p:nvSpPr>
           <p:spPr>
             <a:xfrm>
-              <a:off x="9334500" y="0"/>
-              <a:ext cx="2854327" cy="6866468"/>
+              <a:off x="9334501" y="-1"/>
+              <a:ext cx="2854329" cy="6866471"/>
             </a:xfrm>
             <a:custGeom>
               <a:avLst/>
@@ -921,12 +949,19 @@
             <a:effectLst/>
           </p:spPr>
           <p:txBody>
-            <a:bodyPr wrap="square" lIns="45719" tIns="45719" rIns="45719" bIns="45719" numCol="1" anchor="t">
+            <a:bodyPr wrap="square" lIns="45718" tIns="45718" rIns="45718" bIns="45718" numCol="1" anchor="t">
               <a:noAutofit/>
             </a:bodyPr>
             <a:lstStyle/>
             <a:p>
-              <a:pPr/>
+              <a:pPr>
+                <a:defRPr>
+                  <a:latin typeface="+mj-lt"/>
+                  <a:ea typeface="+mj-ea"/>
+                  <a:cs typeface="+mj-cs"/>
+                  <a:sym typeface="Trebuchet MS"/>
+                </a:defRPr>
+              </a:pPr>
             </a:p>
           </p:txBody>
         </p:sp>
@@ -938,8 +973,8 @@
           </p:nvSpPr>
           <p:spPr>
             <a:xfrm>
-              <a:off x="10898730" y="0"/>
-              <a:ext cx="1290095" cy="6866468"/>
+              <a:off x="10898732" y="-1"/>
+              <a:ext cx="1290096" cy="6866471"/>
             </a:xfrm>
             <a:custGeom>
               <a:avLst/>
@@ -993,12 +1028,19 @@
             <a:effectLst/>
           </p:spPr>
           <p:txBody>
-            <a:bodyPr wrap="square" lIns="45719" tIns="45719" rIns="45719" bIns="45719" numCol="1" anchor="t">
+            <a:bodyPr wrap="square" lIns="45718" tIns="45718" rIns="45718" bIns="45718" numCol="1" anchor="t">
               <a:noAutofit/>
             </a:bodyPr>
             <a:lstStyle/>
             <a:p>
-              <a:pPr/>
+              <a:pPr>
+                <a:defRPr>
+                  <a:latin typeface="+mj-lt"/>
+                  <a:ea typeface="+mj-ea"/>
+                  <a:cs typeface="+mj-cs"/>
+                  <a:sym typeface="Trebuchet MS"/>
+                </a:defRPr>
+              </a:pPr>
             </a:p>
           </p:txBody>
         </p:sp>
@@ -1010,8 +1052,8 @@
           </p:nvSpPr>
           <p:spPr>
             <a:xfrm>
-              <a:off x="10938999" y="0"/>
-              <a:ext cx="1249826" cy="6866468"/>
+              <a:off x="10939001" y="-1"/>
+              <a:ext cx="1249827" cy="6866471"/>
             </a:xfrm>
             <a:custGeom>
               <a:avLst/>
@@ -1065,12 +1107,19 @@
             <a:effectLst/>
           </p:spPr>
           <p:txBody>
-            <a:bodyPr wrap="square" lIns="45719" tIns="45719" rIns="45719" bIns="45719" numCol="1" anchor="t">
+            <a:bodyPr wrap="square" lIns="45718" tIns="45718" rIns="45718" bIns="45718" numCol="1" anchor="t">
               <a:noAutofit/>
             </a:bodyPr>
             <a:lstStyle/>
             <a:p>
-              <a:pPr/>
+              <a:pPr>
+                <a:defRPr>
+                  <a:latin typeface="+mj-lt"/>
+                  <a:ea typeface="+mj-ea"/>
+                  <a:cs typeface="+mj-cs"/>
+                  <a:sym typeface="Trebuchet MS"/>
+                </a:defRPr>
+              </a:pPr>
             </a:p>
           </p:txBody>
         </p:sp>
@@ -1082,8 +1131,8 @@
           </p:nvSpPr>
           <p:spPr>
             <a:xfrm>
-              <a:off x="10371666" y="3598333"/>
-              <a:ext cx="1817160" cy="3268134"/>
+              <a:off x="10371667" y="3598334"/>
+              <a:ext cx="1817162" cy="3268136"/>
             </a:xfrm>
             <a:custGeom>
               <a:avLst/>
@@ -1131,12 +1180,19 @@
             <a:effectLst/>
           </p:spPr>
           <p:txBody>
-            <a:bodyPr wrap="square" lIns="45719" tIns="45719" rIns="45719" bIns="45719" numCol="1" anchor="t">
+            <a:bodyPr wrap="square" lIns="45718" tIns="45718" rIns="45718" bIns="45718" numCol="1" anchor="t">
               <a:noAutofit/>
             </a:bodyPr>
             <a:lstStyle/>
             <a:p>
-              <a:pPr/>
+              <a:pPr>
+                <a:defRPr>
+                  <a:latin typeface="+mj-lt"/>
+                  <a:ea typeface="+mj-ea"/>
+                  <a:cs typeface="+mj-cs"/>
+                  <a:sym typeface="Trebuchet MS"/>
+                </a:defRPr>
+              </a:pPr>
             </a:p>
           </p:txBody>
         </p:sp>
@@ -1152,7 +1208,7 @@
         <p:spPr>
           <a:xfrm>
             <a:off x="1507067" y="2404534"/>
-            <a:ext cx="7766937" cy="1646303"/>
+            <a:ext cx="7766937" cy="1646304"/>
           </a:xfrm>
           <a:prstGeom prst="rect">
             <a:avLst/>
@@ -1183,8 +1239,8 @@
         </p:nvSpPr>
         <p:spPr>
           <a:xfrm>
-            <a:off x="1507067" y="4050832"/>
-            <a:ext cx="7766937" cy="1096901"/>
+            <a:off x="1507067" y="4050831"/>
+            <a:ext cx="7766937" cy="1096902"/>
           </a:xfrm>
           <a:prstGeom prst="rect">
             <a:avLst/>
@@ -1196,6 +1252,7 @@
             <a:lvl1pPr marL="0" indent="0" algn="r">
               <a:buClrTx/>
               <a:buSzTx/>
+              <a:buFontTx/>
               <a:buNone/>
               <a:defRPr>
                 <a:solidFill>
@@ -1203,9 +1260,10 @@
                 </a:solidFill>
               </a:defRPr>
             </a:lvl1pPr>
-            <a:lvl2pPr marL="0" indent="457200" algn="r">
+            <a:lvl2pPr marL="0" indent="0" algn="r">
               <a:buClrTx/>
               <a:buSzTx/>
+              <a:buFontTx/>
               <a:buNone/>
               <a:defRPr>
                 <a:solidFill>
@@ -1213,9 +1271,10 @@
                 </a:solidFill>
               </a:defRPr>
             </a:lvl2pPr>
-            <a:lvl3pPr marL="0" indent="914400" algn="r">
+            <a:lvl3pPr marL="0" indent="0" algn="r">
               <a:buClrTx/>
               <a:buSzTx/>
+              <a:buFontTx/>
               <a:buNone/>
               <a:defRPr>
                 <a:solidFill>
@@ -1223,9 +1282,10 @@
                 </a:solidFill>
               </a:defRPr>
             </a:lvl3pPr>
-            <a:lvl4pPr marL="0" indent="1371600" algn="r">
+            <a:lvl4pPr marL="0" indent="0" algn="r">
               <a:buClrTx/>
               <a:buSzTx/>
+              <a:buFontTx/>
               <a:buNone/>
               <a:defRPr>
                 <a:solidFill>
@@ -1233,9 +1293,10 @@
                 </a:solidFill>
               </a:defRPr>
             </a:lvl4pPr>
-            <a:lvl5pPr marL="0" indent="1828800" algn="r">
+            <a:lvl5pPr marL="0" indent="0" algn="r">
               <a:buClrTx/>
               <a:buSzTx/>
+              <a:buFontTx/>
               <a:buNone/>
               <a:defRPr>
                 <a:solidFill>
@@ -1335,7 +1396,7 @@
         <p:spPr>
           <a:xfrm>
             <a:off x="677335" y="609600"/>
-            <a:ext cx="8596669" cy="3403600"/>
+            <a:ext cx="8596670" cy="3403600"/>
           </a:xfrm>
           <a:prstGeom prst="rect">
             <a:avLst/>
@@ -1367,7 +1428,7 @@
         <p:spPr>
           <a:xfrm>
             <a:off x="677335" y="4470400"/>
-            <a:ext cx="8596669" cy="1570962"/>
+            <a:ext cx="8596670" cy="1570962"/>
           </a:xfrm>
           <a:prstGeom prst="rect">
             <a:avLst/>
@@ -1379,26 +1440,31 @@
             <a:lvl1pPr marL="0" indent="0">
               <a:buClrTx/>
               <a:buSzTx/>
+              <a:buFontTx/>
               <a:buNone/>
             </a:lvl1pPr>
-            <a:lvl2pPr marL="0" indent="457200">
+            <a:lvl2pPr marL="0" indent="0">
               <a:buClrTx/>
               <a:buSzTx/>
+              <a:buFontTx/>
               <a:buNone/>
             </a:lvl2pPr>
-            <a:lvl3pPr marL="0" indent="914400">
+            <a:lvl3pPr marL="0" indent="0">
               <a:buClrTx/>
               <a:buSzTx/>
+              <a:buFontTx/>
               <a:buNone/>
             </a:lvl3pPr>
-            <a:lvl4pPr marL="0" indent="1371600">
+            <a:lvl4pPr marL="0" indent="0">
               <a:buClrTx/>
               <a:buSzTx/>
+              <a:buFontTx/>
               <a:buNone/>
             </a:lvl4pPr>
-            <a:lvl5pPr marL="0" indent="1828800">
+            <a:lvl5pPr marL="0" indent="0">
               <a:buClrTx/>
               <a:buSzTx/>
+              <a:buFontTx/>
               <a:buNone/>
             </a:lvl5pPr>
           </a:lstStyle>
@@ -1537,6 +1603,7 @@
             <a:lvl1pPr marL="0" indent="0">
               <a:buClrTx/>
               <a:buSzTx/>
+              <a:buFontTx/>
               <a:buNone/>
               <a:defRPr sz="1600">
                 <a:solidFill>
@@ -1544,9 +1611,10 @@
                 </a:solidFill>
               </a:defRPr>
             </a:lvl1pPr>
-            <a:lvl2pPr marL="0" indent="457200">
+            <a:lvl2pPr marL="0" indent="0">
               <a:buClrTx/>
               <a:buSzTx/>
+              <a:buFontTx/>
               <a:buNone/>
               <a:defRPr sz="1600">
                 <a:solidFill>
@@ -1554,9 +1622,10 @@
                 </a:solidFill>
               </a:defRPr>
             </a:lvl2pPr>
-            <a:lvl3pPr marL="0" indent="914400">
+            <a:lvl3pPr marL="0" indent="0">
               <a:buClrTx/>
               <a:buSzTx/>
+              <a:buFontTx/>
               <a:buNone/>
               <a:defRPr sz="1600">
                 <a:solidFill>
@@ -1564,9 +1633,10 @@
                 </a:solidFill>
               </a:defRPr>
             </a:lvl3pPr>
-            <a:lvl4pPr marL="0" indent="1371600">
+            <a:lvl4pPr marL="0" indent="0">
               <a:buClrTx/>
               <a:buSzTx/>
+              <a:buFontTx/>
               <a:buNone/>
               <a:defRPr sz="1600">
                 <a:solidFill>
@@ -1574,9 +1644,10 @@
                 </a:solidFill>
               </a:defRPr>
             </a:lvl4pPr>
-            <a:lvl5pPr marL="0" indent="1828800">
+            <a:lvl5pPr marL="0" indent="0">
               <a:buClrTx/>
               <a:buSzTx/>
+              <a:buFontTx/>
               <a:buNone/>
               <a:defRPr sz="1600">
                 <a:solidFill>
@@ -1627,8 +1698,8 @@
         </p:nvSpPr>
         <p:spPr>
           <a:xfrm>
-            <a:off x="677334" y="4470399"/>
-            <a:ext cx="8596670" cy="1570964"/>
+            <a:off x="677334" y="4470398"/>
+            <a:ext cx="8596670" cy="1570965"/>
           </a:xfrm>
           <a:prstGeom prst="rect">
             <a:avLst/>
@@ -1638,11 +1709,7 @@
           <a:bodyPr anchor="ctr"/>
           <a:lstStyle/>
           <a:p>
-            <a:pPr marL="0" indent="0">
-              <a:buClrTx/>
-              <a:buSzTx/>
-              <a:buNone/>
-            </a:pPr>
+            <a:pPr/>
           </a:p>
         </p:txBody>
       </p:sp>
@@ -1654,8 +1721,8 @@
         </p:nvSpPr>
         <p:spPr>
           <a:xfrm>
-            <a:off x="541869" y="469465"/>
-            <a:ext cx="609601" cy="1226602"/>
+            <a:off x="541868" y="469465"/>
+            <a:ext cx="609603" cy="1226600"/>
           </a:xfrm>
           <a:prstGeom prst="rect">
             <a:avLst/>
@@ -1670,7 +1737,7 @@
           </a:extLst>
         </p:spPr>
         <p:txBody>
-          <a:bodyPr lIns="45719" rIns="45719" anchor="ctr">
+          <a:bodyPr lIns="45718" tIns="45718" rIns="45718" bIns="45718" anchor="ctr">
             <a:spAutoFit/>
           </a:bodyPr>
           <a:lstStyle>
@@ -1702,8 +1769,8 @@
         </p:nvSpPr>
         <p:spPr>
           <a:xfrm>
-            <a:off x="8893010" y="2565643"/>
-            <a:ext cx="609601" cy="1226602"/>
+            <a:off x="8893009" y="2565643"/>
+            <a:ext cx="609602" cy="1226600"/>
           </a:xfrm>
           <a:prstGeom prst="rect">
             <a:avLst/>
@@ -1718,7 +1785,7 @@
           </a:extLst>
         </p:spPr>
         <p:txBody>
-          <a:bodyPr lIns="45719" rIns="45719" anchor="ctr">
+          <a:bodyPr lIns="45718" tIns="45718" rIns="45718" bIns="45718" anchor="ctr">
             <a:spAutoFit/>
           </a:bodyPr>
           <a:lstStyle>
@@ -1801,7 +1868,7 @@
         <p:spPr>
           <a:xfrm>
             <a:off x="677335" y="1931988"/>
-            <a:ext cx="8596669" cy="2595461"/>
+            <a:ext cx="8596670" cy="2595462"/>
           </a:xfrm>
           <a:prstGeom prst="rect">
             <a:avLst/>
@@ -1833,7 +1900,7 @@
         <p:spPr>
           <a:xfrm>
             <a:off x="677335" y="4527448"/>
-            <a:ext cx="8596669" cy="1513915"/>
+            <a:ext cx="8596670" cy="1513916"/>
           </a:xfrm>
           <a:prstGeom prst="rect">
             <a:avLst/>
@@ -1845,26 +1912,31 @@
             <a:lvl1pPr marL="0" indent="0">
               <a:buClrTx/>
               <a:buSzTx/>
+              <a:buFontTx/>
               <a:buNone/>
             </a:lvl1pPr>
-            <a:lvl2pPr marL="0" indent="457200">
+            <a:lvl2pPr marL="0" indent="0">
               <a:buClrTx/>
               <a:buSzTx/>
+              <a:buFontTx/>
               <a:buNone/>
             </a:lvl2pPr>
-            <a:lvl3pPr marL="0" indent="914400">
+            <a:lvl3pPr marL="0" indent="0">
               <a:buClrTx/>
               <a:buSzTx/>
+              <a:buFontTx/>
               <a:buNone/>
             </a:lvl3pPr>
-            <a:lvl4pPr marL="0" indent="1371600">
+            <a:lvl4pPr marL="0" indent="0">
               <a:buClrTx/>
               <a:buSzTx/>
+              <a:buFontTx/>
               <a:buNone/>
             </a:lvl4pPr>
-            <a:lvl5pPr marL="0" indent="1828800">
+            <a:lvl5pPr marL="0" indent="0">
               <a:buClrTx/>
               <a:buSzTx/>
+              <a:buFontTx/>
               <a:buNone/>
             </a:lvl5pPr>
           </a:lstStyle>
@@ -2003,30 +2075,35 @@
             <a:lvl1pPr marL="0" indent="0">
               <a:buClrTx/>
               <a:buSzTx/>
+              <a:buFontTx/>
               <a:buNone/>
               <a:defRPr sz="2400"/>
             </a:lvl1pPr>
-            <a:lvl2pPr marL="0" indent="457200">
+            <a:lvl2pPr marL="0" indent="0">
               <a:buClrTx/>
               <a:buSzTx/>
+              <a:buFontTx/>
               <a:buNone/>
               <a:defRPr sz="2400"/>
             </a:lvl2pPr>
-            <a:lvl3pPr marL="0" indent="914400">
+            <a:lvl3pPr marL="0" indent="0">
               <a:buClrTx/>
               <a:buSzTx/>
+              <a:buFontTx/>
               <a:buNone/>
               <a:defRPr sz="2400"/>
             </a:lvl3pPr>
-            <a:lvl4pPr marL="0" indent="1371600">
+            <a:lvl4pPr marL="0" indent="0">
               <a:buClrTx/>
               <a:buSzTx/>
+              <a:buFontTx/>
               <a:buNone/>
               <a:defRPr sz="2400"/>
             </a:lvl4pPr>
-            <a:lvl5pPr marL="0" indent="1828800">
+            <a:lvl5pPr marL="0" indent="0">
               <a:buClrTx/>
               <a:buSzTx/>
+              <a:buFontTx/>
               <a:buNone/>
               <a:defRPr sz="2400"/>
             </a:lvl5pPr>
@@ -2074,7 +2151,7 @@
         <p:spPr>
           <a:xfrm>
             <a:off x="677334" y="4527448"/>
-            <a:ext cx="8596670" cy="1513915"/>
+            <a:ext cx="8596670" cy="1513916"/>
           </a:xfrm>
           <a:prstGeom prst="rect">
             <a:avLst/>
@@ -2084,16 +2161,7 @@
           <a:bodyPr/>
           <a:lstStyle/>
           <a:p>
-            <a:pPr marL="0" indent="0">
-              <a:buClrTx/>
-              <a:buSzTx/>
-              <a:buNone/>
-              <a:defRPr>
-                <a:solidFill>
-                  <a:srgbClr val="808080"/>
-                </a:solidFill>
-              </a:defRPr>
-            </a:pPr>
+            <a:pPr/>
           </a:p>
         </p:txBody>
       </p:sp>
@@ -2105,8 +2173,8 @@
         </p:nvSpPr>
         <p:spPr>
           <a:xfrm>
-            <a:off x="541869" y="469465"/>
-            <a:ext cx="609601" cy="1226602"/>
+            <a:off x="541868" y="469465"/>
+            <a:ext cx="609603" cy="1226600"/>
           </a:xfrm>
           <a:prstGeom prst="rect">
             <a:avLst/>
@@ -2121,7 +2189,7 @@
           </a:extLst>
         </p:spPr>
         <p:txBody>
-          <a:bodyPr lIns="45719" rIns="45719" anchor="ctr">
+          <a:bodyPr lIns="45718" tIns="45718" rIns="45718" bIns="45718" anchor="ctr">
             <a:spAutoFit/>
           </a:bodyPr>
           <a:lstStyle>
@@ -2153,8 +2221,8 @@
         </p:nvSpPr>
         <p:spPr>
           <a:xfrm>
-            <a:off x="8893010" y="2565643"/>
-            <a:ext cx="609601" cy="1226602"/>
+            <a:off x="8893009" y="2565643"/>
+            <a:ext cx="609602" cy="1226600"/>
           </a:xfrm>
           <a:prstGeom prst="rect">
             <a:avLst/>
@@ -2169,7 +2237,7 @@
           </a:extLst>
         </p:spPr>
         <p:txBody>
-          <a:bodyPr lIns="45719" rIns="45719" anchor="ctr">
+          <a:bodyPr lIns="45718" tIns="45718" rIns="45718" bIns="45718" anchor="ctr">
             <a:spAutoFit/>
           </a:bodyPr>
           <a:lstStyle>
@@ -2296,6 +2364,7 @@
             <a:lvl1pPr marL="0" indent="0">
               <a:buClrTx/>
               <a:buSzTx/>
+              <a:buFontTx/>
               <a:buNone/>
               <a:defRPr sz="2400">
                 <a:solidFill>
@@ -2303,9 +2372,10 @@
                 </a:solidFill>
               </a:defRPr>
             </a:lvl1pPr>
-            <a:lvl2pPr marL="0" indent="457200">
+            <a:lvl2pPr marL="0" indent="0">
               <a:buClrTx/>
               <a:buSzTx/>
+              <a:buFontTx/>
               <a:buNone/>
               <a:defRPr sz="2400">
                 <a:solidFill>
@@ -2313,9 +2383,10 @@
                 </a:solidFill>
               </a:defRPr>
             </a:lvl2pPr>
-            <a:lvl3pPr marL="0" indent="914400">
+            <a:lvl3pPr marL="0" indent="0">
               <a:buClrTx/>
               <a:buSzTx/>
+              <a:buFontTx/>
               <a:buNone/>
               <a:defRPr sz="2400">
                 <a:solidFill>
@@ -2323,9 +2394,10 @@
                 </a:solidFill>
               </a:defRPr>
             </a:lvl3pPr>
-            <a:lvl4pPr marL="0" indent="1371600">
+            <a:lvl4pPr marL="0" indent="0">
               <a:buClrTx/>
               <a:buSzTx/>
+              <a:buFontTx/>
               <a:buNone/>
               <a:defRPr sz="2400">
                 <a:solidFill>
@@ -2333,9 +2405,10 @@
                 </a:solidFill>
               </a:defRPr>
             </a:lvl4pPr>
-            <a:lvl5pPr marL="0" indent="1828800">
+            <a:lvl5pPr marL="0" indent="0">
               <a:buClrTx/>
               <a:buSzTx/>
+              <a:buFontTx/>
               <a:buNone/>
               <a:defRPr sz="2400">
                 <a:solidFill>
@@ -2387,7 +2460,7 @@
         <p:spPr>
           <a:xfrm>
             <a:off x="677334" y="4527448"/>
-            <a:ext cx="8596670" cy="1513915"/>
+            <a:ext cx="8596670" cy="1513916"/>
           </a:xfrm>
           <a:prstGeom prst="rect">
             <a:avLst/>
@@ -2397,16 +2470,7 @@
           <a:bodyPr/>
           <a:lstStyle/>
           <a:p>
-            <a:pPr marL="0" indent="0">
-              <a:buClrTx/>
-              <a:buSzTx/>
-              <a:buNone/>
-              <a:defRPr>
-                <a:solidFill>
-                  <a:srgbClr val="808080"/>
-                </a:solidFill>
-              </a:defRPr>
-            </a:pPr>
+            <a:pPr/>
           </a:p>
         </p:txBody>
       </p:sp>
@@ -2467,10 +2531,6 @@
           </p:nvPr>
         </p:nvSpPr>
         <p:spPr>
-          <a:xfrm>
-            <a:off x="677333" y="609600"/>
-            <a:ext cx="8596670" cy="1320800"/>
-          </a:xfrm>
           <a:prstGeom prst="rect">
             <a:avLst/>
           </a:prstGeom>
@@ -2496,8 +2556,8 @@
         </p:nvSpPr>
         <p:spPr>
           <a:xfrm>
-            <a:off x="677333" y="2160589"/>
-            <a:ext cx="8596670" cy="3880773"/>
+            <a:off x="677332" y="2160589"/>
+            <a:ext cx="8596671" cy="3880773"/>
           </a:xfrm>
           <a:prstGeom prst="rect">
             <a:avLst/>
@@ -2597,7 +2657,7 @@
         <p:spPr>
           <a:xfrm>
             <a:off x="7967673" y="609598"/>
-            <a:ext cx="1304744" cy="5251453"/>
+            <a:ext cx="1304745" cy="5251454"/>
           </a:xfrm>
           <a:prstGeom prst="rect">
             <a:avLst/>
@@ -2723,10 +2783,6 @@
           </p:nvPr>
         </p:nvSpPr>
         <p:spPr>
-          <a:xfrm>
-            <a:off x="677333" y="609600"/>
-            <a:ext cx="8596670" cy="1320800"/>
-          </a:xfrm>
           <a:prstGeom prst="rect">
             <a:avLst/>
           </a:prstGeom>
@@ -2752,8 +2808,8 @@
         </p:nvSpPr>
         <p:spPr>
           <a:xfrm>
-            <a:off x="677333" y="2160589"/>
-            <a:ext cx="8596670" cy="3880773"/>
+            <a:off x="677332" y="2160589"/>
+            <a:ext cx="8596671" cy="3880773"/>
           </a:xfrm>
           <a:prstGeom prst="rect">
             <a:avLst/>
@@ -2852,8 +2908,8 @@
         </p:nvSpPr>
         <p:spPr>
           <a:xfrm>
-            <a:off x="677335" y="2700866"/>
-            <a:ext cx="8596669" cy="1826582"/>
+            <a:off x="677335" y="2700865"/>
+            <a:ext cx="8596670" cy="1826583"/>
           </a:xfrm>
           <a:prstGeom prst="rect">
             <a:avLst/>
@@ -2885,7 +2941,7 @@
         <p:spPr>
           <a:xfrm>
             <a:off x="677335" y="4527448"/>
-            <a:ext cx="8596669" cy="860401"/>
+            <a:ext cx="8596670" cy="860402"/>
           </a:xfrm>
           <a:prstGeom prst="rect">
             <a:avLst/>
@@ -2897,6 +2953,7 @@
             <a:lvl1pPr marL="0" indent="0">
               <a:buClrTx/>
               <a:buSzTx/>
+              <a:buFontTx/>
               <a:buNone/>
               <a:defRPr sz="2000">
                 <a:solidFill>
@@ -2904,9 +2961,10 @@
                 </a:solidFill>
               </a:defRPr>
             </a:lvl1pPr>
-            <a:lvl2pPr marL="0" indent="457200">
+            <a:lvl2pPr marL="0" indent="0">
               <a:buClrTx/>
               <a:buSzTx/>
+              <a:buFontTx/>
               <a:buNone/>
               <a:defRPr sz="2000">
                 <a:solidFill>
@@ -2914,9 +2972,10 @@
                 </a:solidFill>
               </a:defRPr>
             </a:lvl2pPr>
-            <a:lvl3pPr marL="0" indent="914400">
+            <a:lvl3pPr marL="0" indent="0">
               <a:buClrTx/>
               <a:buSzTx/>
+              <a:buFontTx/>
               <a:buNone/>
               <a:defRPr sz="2000">
                 <a:solidFill>
@@ -2924,9 +2983,10 @@
                 </a:solidFill>
               </a:defRPr>
             </a:lvl3pPr>
-            <a:lvl4pPr marL="0" indent="1371600">
+            <a:lvl4pPr marL="0" indent="0">
               <a:buClrTx/>
               <a:buSzTx/>
+              <a:buFontTx/>
               <a:buNone/>
               <a:defRPr sz="2000">
                 <a:solidFill>
@@ -2934,9 +2994,10 @@
                 </a:solidFill>
               </a:defRPr>
             </a:lvl4pPr>
-            <a:lvl5pPr marL="0" indent="1828800">
+            <a:lvl5pPr marL="0" indent="0">
               <a:buClrTx/>
               <a:buSzTx/>
+              <a:buFontTx/>
               <a:buNone/>
               <a:defRPr sz="2000">
                 <a:solidFill>
@@ -3034,10 +3095,6 @@
           </p:nvPr>
         </p:nvSpPr>
         <p:spPr>
-          <a:xfrm>
-            <a:off x="677333" y="609600"/>
-            <a:ext cx="8596670" cy="1320800"/>
-          </a:xfrm>
           <a:prstGeom prst="rect">
             <a:avLst/>
           </a:prstGeom>
@@ -3063,8 +3120,8 @@
         </p:nvSpPr>
         <p:spPr>
           <a:xfrm>
-            <a:off x="677333" y="2160589"/>
-            <a:ext cx="4184036" cy="3880773"/>
+            <a:off x="677332" y="2160589"/>
+            <a:ext cx="4184038" cy="3880773"/>
           </a:xfrm>
           <a:prstGeom prst="rect">
             <a:avLst/>
@@ -3162,10 +3219,6 @@
           </p:nvPr>
         </p:nvSpPr>
         <p:spPr>
-          <a:xfrm>
-            <a:off x="677333" y="609600"/>
-            <a:ext cx="8596670" cy="1320800"/>
-          </a:xfrm>
           <a:prstGeom prst="rect">
             <a:avLst/>
           </a:prstGeom>
@@ -3191,8 +3244,8 @@
         </p:nvSpPr>
         <p:spPr>
           <a:xfrm>
-            <a:off x="675744" y="2160983"/>
-            <a:ext cx="4185624" cy="576263"/>
+            <a:off x="675743" y="2160983"/>
+            <a:ext cx="4185625" cy="576264"/>
           </a:xfrm>
           <a:prstGeom prst="rect">
             <a:avLst/>
@@ -3204,30 +3257,35 @@
             <a:lvl1pPr marL="0" indent="0">
               <a:buClrTx/>
               <a:buSzTx/>
+              <a:buFontTx/>
               <a:buNone/>
               <a:defRPr sz="2400"/>
             </a:lvl1pPr>
-            <a:lvl2pPr marL="0" indent="457200">
+            <a:lvl2pPr marL="0" indent="0">
               <a:buClrTx/>
               <a:buSzTx/>
+              <a:buFontTx/>
               <a:buNone/>
               <a:defRPr sz="2400"/>
             </a:lvl2pPr>
-            <a:lvl3pPr marL="0" indent="914400">
+            <a:lvl3pPr marL="0" indent="0">
               <a:buClrTx/>
               <a:buSzTx/>
+              <a:buFontTx/>
               <a:buNone/>
               <a:defRPr sz="2400"/>
             </a:lvl3pPr>
-            <a:lvl4pPr marL="0" indent="1371600">
+            <a:lvl4pPr marL="0" indent="0">
               <a:buClrTx/>
               <a:buSzTx/>
+              <a:buFontTx/>
               <a:buNone/>
               <a:defRPr sz="2400"/>
             </a:lvl4pPr>
-            <a:lvl5pPr marL="0" indent="1828800">
+            <a:lvl5pPr marL="0" indent="0">
               <a:buClrTx/>
               <a:buSzTx/>
+              <a:buFontTx/>
               <a:buNone/>
               <a:defRPr sz="2400"/>
             </a:lvl5pPr>
@@ -3275,7 +3333,7 @@
         <p:spPr>
           <a:xfrm>
             <a:off x="5088382" y="2160983"/>
-            <a:ext cx="4185619" cy="576263"/>
+            <a:ext cx="4185620" cy="576264"/>
           </a:xfrm>
           <a:prstGeom prst="rect">
             <a:avLst/>
@@ -3285,12 +3343,7 @@
           <a:bodyPr anchor="b"/>
           <a:lstStyle/>
           <a:p>
-            <a:pPr marL="0" indent="0">
-              <a:buClrTx/>
-              <a:buSzTx/>
-              <a:buNone/>
-              <a:defRPr sz="2400"/>
-            </a:pPr>
+            <a:pPr/>
           </a:p>
         </p:txBody>
       </p:sp>
@@ -3351,10 +3404,6 @@
           </p:nvPr>
         </p:nvSpPr>
         <p:spPr>
-          <a:xfrm>
-            <a:off x="677333" y="609600"/>
-            <a:ext cx="8596670" cy="1320800"/>
-          </a:xfrm>
           <a:prstGeom prst="rect">
             <a:avLst/>
           </a:prstGeom>
@@ -3476,8 +3525,8 @@
         </p:nvSpPr>
         <p:spPr>
           <a:xfrm>
-            <a:off x="677333" y="1498603"/>
-            <a:ext cx="3854529" cy="1278467"/>
+            <a:off x="677332" y="1498603"/>
+            <a:ext cx="3854531" cy="1278468"/>
           </a:xfrm>
           <a:prstGeom prst="rect">
             <a:avLst/>
@@ -3508,8 +3557,8 @@
         </p:nvSpPr>
         <p:spPr>
           <a:xfrm>
-            <a:off x="4760460" y="514923"/>
-            <a:ext cx="4513543" cy="5526439"/>
+            <a:off x="4760459" y="514922"/>
+            <a:ext cx="4513544" cy="5526441"/>
           </a:xfrm>
           <a:prstGeom prst="rect">
             <a:avLst/>
@@ -3561,7 +3610,7 @@
         <p:spPr>
           <a:xfrm>
             <a:off x="677334" y="2777069"/>
-            <a:ext cx="3854528" cy="2584450"/>
+            <a:ext cx="3854528" cy="2584451"/>
           </a:xfrm>
           <a:prstGeom prst="rect">
             <a:avLst/>
@@ -3571,12 +3620,7 @@
           <a:bodyPr/>
           <a:lstStyle/>
           <a:p>
-            <a:pPr marL="0" indent="0">
-              <a:buClrTx/>
-              <a:buSzTx/>
-              <a:buNone/>
-              <a:defRPr sz="1400"/>
-            </a:pPr>
+            <a:pPr/>
           </a:p>
         </p:txBody>
       </p:sp>
@@ -3638,8 +3682,8 @@
         </p:nvSpPr>
         <p:spPr>
           <a:xfrm>
-            <a:off x="677333" y="4800600"/>
-            <a:ext cx="8596668" cy="566738"/>
+            <a:off x="677332" y="4800600"/>
+            <a:ext cx="8596670" cy="566738"/>
           </a:xfrm>
           <a:prstGeom prst="rect">
             <a:avLst/>
@@ -3670,15 +3714,15 @@
         </p:nvSpPr>
         <p:spPr>
           <a:xfrm>
-            <a:off x="677333" y="609600"/>
-            <a:ext cx="8596670" cy="3845718"/>
+            <a:off x="677332" y="609600"/>
+            <a:ext cx="8596671" cy="3845718"/>
           </a:xfrm>
           <a:prstGeom prst="rect">
             <a:avLst/>
           </a:prstGeom>
         </p:spPr>
         <p:txBody>
-          <a:bodyPr lIns="91439" rIns="91439">
+          <a:bodyPr lIns="91439" tIns="45719" rIns="91439" bIns="45719">
             <a:noAutofit/>
           </a:bodyPr>
           <a:lstStyle/>
@@ -3697,8 +3741,8 @@
         </p:nvSpPr>
         <p:spPr>
           <a:xfrm>
-            <a:off x="677333" y="5367337"/>
-            <a:ext cx="8596668" cy="674025"/>
+            <a:off x="677332" y="5367337"/>
+            <a:ext cx="8596670" cy="674026"/>
           </a:xfrm>
           <a:prstGeom prst="rect">
             <a:avLst/>
@@ -3710,30 +3754,35 @@
             <a:lvl1pPr marL="0" indent="0">
               <a:buClrTx/>
               <a:buSzTx/>
+              <a:buFontTx/>
               <a:buNone/>
               <a:defRPr sz="1200"/>
             </a:lvl1pPr>
-            <a:lvl2pPr marL="0" indent="457200">
+            <a:lvl2pPr marL="0" indent="0">
               <a:buClrTx/>
               <a:buSzTx/>
+              <a:buFontTx/>
               <a:buNone/>
               <a:defRPr sz="1200"/>
             </a:lvl2pPr>
-            <a:lvl3pPr marL="0" indent="914400">
+            <a:lvl3pPr marL="0" indent="0">
               <a:buClrTx/>
               <a:buSzTx/>
+              <a:buFontTx/>
               <a:buNone/>
               <a:defRPr sz="1200"/>
             </a:lvl3pPr>
-            <a:lvl4pPr marL="0" indent="1371600">
+            <a:lvl4pPr marL="0" indent="0">
               <a:buClrTx/>
               <a:buSzTx/>
+              <a:buFontTx/>
               <a:buNone/>
               <a:defRPr sz="1200"/>
             </a:lvl4pPr>
-            <a:lvl5pPr marL="0" indent="1828800">
+            <a:lvl5pPr marL="0" indent="0">
               <a:buClrTx/>
               <a:buSzTx/>
+              <a:buFontTx/>
               <a:buNone/>
               <a:defRPr sz="1200"/>
             </a:lvl5pPr>
@@ -3833,10 +3882,10 @@
         </p:nvGrpSpPr>
         <p:grpSpPr>
           <a:xfrm>
-            <a:off x="-1" y="-8468"/>
-            <a:ext cx="12192002" cy="6866469"/>
-            <a:chOff x="0" y="0"/>
-            <a:chExt cx="12192000" cy="6866467"/>
+            <a:off x="-3" y="-8469"/>
+            <a:ext cx="12192006" cy="6866472"/>
+            <a:chOff x="-1" y="0"/>
+            <a:chExt cx="12192004" cy="6866470"/>
           </a:xfrm>
         </p:grpSpPr>
         <p:sp>
@@ -3847,8 +3896,8 @@
           </p:nvSpPr>
           <p:spPr>
             <a:xfrm>
-              <a:off x="9371012" y="8466"/>
-              <a:ext cx="1219201" cy="6858002"/>
+              <a:off x="9371013" y="8466"/>
+              <a:ext cx="1219202" cy="6858005"/>
             </a:xfrm>
             <a:prstGeom prst="line">
               <a:avLst/>
@@ -3866,7 +3915,7 @@
             <a:effectLst/>
           </p:spPr>
           <p:txBody>
-            <a:bodyPr wrap="square" lIns="45719" tIns="45719" rIns="45719" bIns="45719" numCol="1" anchor="t">
+            <a:bodyPr wrap="square" lIns="45718" tIns="45718" rIns="45718" bIns="45718" numCol="1" anchor="t">
               <a:noAutofit/>
             </a:bodyPr>
             <a:lstStyle/>
@@ -3883,8 +3932,8 @@
           </p:nvSpPr>
           <p:spPr>
             <a:xfrm flipH="1">
-              <a:off x="7425267" y="3689879"/>
-              <a:ext cx="4763559" cy="3176588"/>
+              <a:off x="7425268" y="3689880"/>
+              <a:ext cx="4763561" cy="3176589"/>
             </a:xfrm>
             <a:prstGeom prst="line">
               <a:avLst/>
@@ -3902,7 +3951,7 @@
             <a:effectLst/>
           </p:spPr>
           <p:txBody>
-            <a:bodyPr wrap="square" lIns="45719" tIns="45719" rIns="45719" bIns="45719" numCol="1" anchor="t">
+            <a:bodyPr wrap="square" lIns="45718" tIns="45718" rIns="45718" bIns="45718" numCol="1" anchor="t">
               <a:noAutofit/>
             </a:bodyPr>
             <a:lstStyle/>
@@ -3919,8 +3968,8 @@
           </p:nvSpPr>
           <p:spPr>
             <a:xfrm>
-              <a:off x="9181476" y="0"/>
-              <a:ext cx="3007350" cy="6866468"/>
+              <a:off x="9181477" y="-1"/>
+              <a:ext cx="3007352" cy="6866471"/>
             </a:xfrm>
             <a:custGeom>
               <a:avLst/>
@@ -3974,12 +4023,19 @@
             <a:effectLst/>
           </p:spPr>
           <p:txBody>
-            <a:bodyPr wrap="square" lIns="45719" tIns="45719" rIns="45719" bIns="45719" numCol="1" anchor="t">
+            <a:bodyPr wrap="square" lIns="45718" tIns="45718" rIns="45718" bIns="45718" numCol="1" anchor="t">
               <a:noAutofit/>
             </a:bodyPr>
             <a:lstStyle/>
             <a:p>
-              <a:pPr/>
+              <a:pPr>
+                <a:defRPr>
+                  <a:latin typeface="+mj-lt"/>
+                  <a:ea typeface="+mj-ea"/>
+                  <a:cs typeface="+mj-cs"/>
+                  <a:sym typeface="Trebuchet MS"/>
+                </a:defRPr>
+              </a:pPr>
             </a:p>
           </p:txBody>
         </p:sp>
@@ -3991,8 +4047,8 @@
           </p:nvSpPr>
           <p:spPr>
             <a:xfrm>
-              <a:off x="9603441" y="0"/>
-              <a:ext cx="2588560" cy="6866468"/>
+              <a:off x="9603442" y="-1"/>
+              <a:ext cx="2588562" cy="6866471"/>
             </a:xfrm>
             <a:custGeom>
               <a:avLst/>
@@ -4046,12 +4102,19 @@
             <a:effectLst/>
           </p:spPr>
           <p:txBody>
-            <a:bodyPr wrap="square" lIns="45719" tIns="45719" rIns="45719" bIns="45719" numCol="1" anchor="t">
+            <a:bodyPr wrap="square" lIns="45718" tIns="45718" rIns="45718" bIns="45718" numCol="1" anchor="t">
               <a:noAutofit/>
             </a:bodyPr>
             <a:lstStyle/>
             <a:p>
-              <a:pPr/>
+              <a:pPr>
+                <a:defRPr>
+                  <a:latin typeface="+mj-lt"/>
+                  <a:ea typeface="+mj-ea"/>
+                  <a:cs typeface="+mj-cs"/>
+                  <a:sym typeface="Trebuchet MS"/>
+                </a:defRPr>
+              </a:pPr>
             </a:p>
           </p:txBody>
         </p:sp>
@@ -4063,8 +4126,8 @@
           </p:nvSpPr>
           <p:spPr>
             <a:xfrm>
-              <a:off x="8932333" y="3056466"/>
-              <a:ext cx="3259668" cy="3810002"/>
+              <a:off x="8932334" y="3056466"/>
+              <a:ext cx="3259670" cy="3810005"/>
             </a:xfrm>
             <a:custGeom>
               <a:avLst/>
@@ -4112,12 +4175,19 @@
             <a:effectLst/>
           </p:spPr>
           <p:txBody>
-            <a:bodyPr wrap="square" lIns="45719" tIns="45719" rIns="45719" bIns="45719" numCol="1" anchor="t">
+            <a:bodyPr wrap="square" lIns="45718" tIns="45718" rIns="45718" bIns="45718" numCol="1" anchor="t">
               <a:noAutofit/>
             </a:bodyPr>
             <a:lstStyle/>
             <a:p>
-              <a:pPr/>
+              <a:pPr>
+                <a:defRPr>
+                  <a:latin typeface="+mj-lt"/>
+                  <a:ea typeface="+mj-ea"/>
+                  <a:cs typeface="+mj-cs"/>
+                  <a:sym typeface="Trebuchet MS"/>
+                </a:defRPr>
+              </a:pPr>
             </a:p>
           </p:txBody>
         </p:sp>
@@ -4129,8 +4199,8 @@
           </p:nvSpPr>
           <p:spPr>
             <a:xfrm>
-              <a:off x="9334500" y="0"/>
-              <a:ext cx="2854327" cy="6866468"/>
+              <a:off x="9334501" y="-1"/>
+              <a:ext cx="2854329" cy="6866471"/>
             </a:xfrm>
             <a:custGeom>
               <a:avLst/>
@@ -4184,12 +4254,19 @@
             <a:effectLst/>
           </p:spPr>
           <p:txBody>
-            <a:bodyPr wrap="square" lIns="45719" tIns="45719" rIns="45719" bIns="45719" numCol="1" anchor="t">
+            <a:bodyPr wrap="square" lIns="45718" tIns="45718" rIns="45718" bIns="45718" numCol="1" anchor="t">
               <a:noAutofit/>
             </a:bodyPr>
             <a:lstStyle/>
             <a:p>
-              <a:pPr/>
+              <a:pPr>
+                <a:defRPr>
+                  <a:latin typeface="+mj-lt"/>
+                  <a:ea typeface="+mj-ea"/>
+                  <a:cs typeface="+mj-cs"/>
+                  <a:sym typeface="Trebuchet MS"/>
+                </a:defRPr>
+              </a:pPr>
             </a:p>
           </p:txBody>
         </p:sp>
@@ -4201,8 +4278,8 @@
           </p:nvSpPr>
           <p:spPr>
             <a:xfrm>
-              <a:off x="10898730" y="0"/>
-              <a:ext cx="1290095" cy="6866468"/>
+              <a:off x="10898732" y="-1"/>
+              <a:ext cx="1290096" cy="6866471"/>
             </a:xfrm>
             <a:custGeom>
               <a:avLst/>
@@ -4256,12 +4333,19 @@
             <a:effectLst/>
           </p:spPr>
           <p:txBody>
-            <a:bodyPr wrap="square" lIns="45719" tIns="45719" rIns="45719" bIns="45719" numCol="1" anchor="t">
+            <a:bodyPr wrap="square" lIns="45718" tIns="45718" rIns="45718" bIns="45718" numCol="1" anchor="t">
               <a:noAutofit/>
             </a:bodyPr>
             <a:lstStyle/>
             <a:p>
-              <a:pPr/>
+              <a:pPr>
+                <a:defRPr>
+                  <a:latin typeface="+mj-lt"/>
+                  <a:ea typeface="+mj-ea"/>
+                  <a:cs typeface="+mj-cs"/>
+                  <a:sym typeface="Trebuchet MS"/>
+                </a:defRPr>
+              </a:pPr>
             </a:p>
           </p:txBody>
         </p:sp>
@@ -4273,8 +4357,8 @@
           </p:nvSpPr>
           <p:spPr>
             <a:xfrm>
-              <a:off x="10938999" y="0"/>
-              <a:ext cx="1249826" cy="6866468"/>
+              <a:off x="10939001" y="-1"/>
+              <a:ext cx="1249827" cy="6866471"/>
             </a:xfrm>
             <a:custGeom>
               <a:avLst/>
@@ -4328,12 +4412,19 @@
             <a:effectLst/>
           </p:spPr>
           <p:txBody>
-            <a:bodyPr wrap="square" lIns="45719" tIns="45719" rIns="45719" bIns="45719" numCol="1" anchor="t">
+            <a:bodyPr wrap="square" lIns="45718" tIns="45718" rIns="45718" bIns="45718" numCol="1" anchor="t">
               <a:noAutofit/>
             </a:bodyPr>
             <a:lstStyle/>
             <a:p>
-              <a:pPr/>
+              <a:pPr>
+                <a:defRPr>
+                  <a:latin typeface="+mj-lt"/>
+                  <a:ea typeface="+mj-ea"/>
+                  <a:cs typeface="+mj-cs"/>
+                  <a:sym typeface="Trebuchet MS"/>
+                </a:defRPr>
+              </a:pPr>
             </a:p>
           </p:txBody>
         </p:sp>
@@ -4345,8 +4436,8 @@
           </p:nvSpPr>
           <p:spPr>
             <a:xfrm>
-              <a:off x="10371666" y="3598333"/>
-              <a:ext cx="1817160" cy="3268134"/>
+              <a:off x="10371667" y="3598334"/>
+              <a:ext cx="1817162" cy="3268136"/>
             </a:xfrm>
             <a:custGeom>
               <a:avLst/>
@@ -4394,12 +4485,19 @@
             <a:effectLst/>
           </p:spPr>
           <p:txBody>
-            <a:bodyPr wrap="square" lIns="45719" tIns="45719" rIns="45719" bIns="45719" numCol="1" anchor="t">
+            <a:bodyPr wrap="square" lIns="45718" tIns="45718" rIns="45718" bIns="45718" numCol="1" anchor="t">
               <a:noAutofit/>
             </a:bodyPr>
             <a:lstStyle/>
             <a:p>
-              <a:pPr/>
+              <a:pPr>
+                <a:defRPr>
+                  <a:latin typeface="+mj-lt"/>
+                  <a:ea typeface="+mj-ea"/>
+                  <a:cs typeface="+mj-cs"/>
+                  <a:sym typeface="Trebuchet MS"/>
+                </a:defRPr>
+              </a:pPr>
             </a:p>
           </p:txBody>
         </p:sp>
@@ -4411,8 +4509,8 @@
           </p:nvSpPr>
           <p:spPr>
             <a:xfrm>
-              <a:off x="-1" y="4021666"/>
-              <a:ext cx="448734" cy="2844802"/>
+              <a:off x="-2" y="4021667"/>
+              <a:ext cx="448736" cy="2844804"/>
             </a:xfrm>
             <a:custGeom>
               <a:avLst/>
@@ -4460,12 +4558,19 @@
             <a:effectLst/>
           </p:spPr>
           <p:txBody>
-            <a:bodyPr wrap="square" lIns="45719" tIns="45719" rIns="45719" bIns="45719" numCol="1" anchor="t">
+            <a:bodyPr wrap="square" lIns="45718" tIns="45718" rIns="45718" bIns="45718" numCol="1" anchor="t">
               <a:noAutofit/>
             </a:bodyPr>
             <a:lstStyle/>
             <a:p>
-              <a:pPr/>
+              <a:pPr>
+                <a:defRPr>
+                  <a:latin typeface="+mj-lt"/>
+                  <a:ea typeface="+mj-ea"/>
+                  <a:cs typeface="+mj-cs"/>
+                  <a:sym typeface="Trebuchet MS"/>
+                </a:defRPr>
+              </a:pPr>
             </a:p>
           </p:txBody>
         </p:sp>
@@ -4480,8 +4585,8 @@
         </p:nvSpPr>
         <p:spPr>
           <a:xfrm>
-            <a:off x="609600" y="274637"/>
-            <a:ext cx="10972800" cy="1325564"/>
+            <a:off x="677332" y="609600"/>
+            <a:ext cx="8596671" cy="1320800"/>
           </a:xfrm>
           <a:prstGeom prst="rect">
             <a:avLst/>
@@ -4496,7 +4601,7 @@
           </a:extLst>
         </p:spPr>
         <p:txBody>
-          <a:bodyPr lIns="45719" rIns="45719">
+          <a:bodyPr lIns="45718" tIns="45718" rIns="45718" bIns="45718">
             <a:normAutofit fontScale="100000" lnSpcReduction="0"/>
           </a:bodyPr>
           <a:lstStyle/>
@@ -4518,8 +4623,8 @@
         </p:nvSpPr>
         <p:spPr>
           <a:xfrm>
-            <a:off x="609600" y="1600200"/>
-            <a:ext cx="10972800" cy="5257800"/>
+            <a:off x="6805083" y="2438400"/>
+            <a:ext cx="4775201" cy="4419600"/>
           </a:xfrm>
           <a:prstGeom prst="rect">
             <a:avLst/>
@@ -4534,7 +4639,7 @@
           </a:extLst>
         </p:spPr>
         <p:txBody>
-          <a:bodyPr lIns="45719" rIns="45719">
+          <a:bodyPr lIns="45718" tIns="45718" rIns="45718" bIns="45718">
             <a:normAutofit fontScale="100000" lnSpcReduction="0"/>
           </a:bodyPr>
           <a:lstStyle/>
@@ -4580,8 +4685,8 @@
         </p:nvSpPr>
         <p:spPr>
           <a:xfrm>
-            <a:off x="9049981" y="6114704"/>
-            <a:ext cx="224022" cy="218441"/>
+            <a:off x="9049983" y="6114705"/>
+            <a:ext cx="224020" cy="218439"/>
           </a:xfrm>
           <a:prstGeom prst="rect">
             <a:avLst/>
@@ -4591,7 +4696,7 @@
           </a:ln>
         </p:spPr>
         <p:txBody>
-          <a:bodyPr wrap="none" lIns="45719" rIns="45719" anchor="ctr">
+          <a:bodyPr wrap="none" lIns="45718" tIns="45718" rIns="45718" bIns="45718" anchor="ctr">
             <a:spAutoFit/>
           </a:bodyPr>
           <a:lstStyle>
@@ -4600,6 +4705,10 @@
                 <a:solidFill>
                   <a:schemeClr val="accent1"/>
                 </a:solidFill>
+                <a:latin typeface="+mj-lt"/>
+                <a:ea typeface="+mj-ea"/>
+                <a:cs typeface="+mj-cs"/>
+                <a:sym typeface="Trebuchet MS"/>
               </a:defRPr>
             </a:lvl1pPr>
           </a:lstStyle>
@@ -4910,8 +5019,8 @@
           <a:schemeClr val="accent1"/>
         </a:buClr>
         <a:buSzPct val="80000"/>
-        <a:buFontTx/>
-        <a:buChar char=""/>
+        <a:buFont typeface="Trebuchet MS"/>
+        <a:buChar char="u"/>
         <a:tabLst/>
         <a:defRPr b="0" baseline="0" cap="none" i="0" spc="0" strike="noStrike" sz="1800" u="none">
           <a:ln>
@@ -4941,8 +5050,8 @@
           <a:schemeClr val="accent1"/>
         </a:buClr>
         <a:buSzPct val="80000"/>
-        <a:buFontTx/>
-        <a:buChar char=""/>
+        <a:buFont typeface="Trebuchet MS"/>
+        <a:buChar char="u"/>
         <a:tabLst/>
         <a:defRPr b="0" baseline="0" cap="none" i="0" spc="0" strike="noStrike" sz="1800" u="none">
           <a:ln>
@@ -4972,8 +5081,8 @@
           <a:schemeClr val="accent1"/>
         </a:buClr>
         <a:buSzPct val="80000"/>
-        <a:buFontTx/>
-        <a:buChar char=""/>
+        <a:buFont typeface="Trebuchet MS"/>
+        <a:buChar char="u"/>
         <a:tabLst/>
         <a:defRPr b="0" baseline="0" cap="none" i="0" spc="0" strike="noStrike" sz="1800" u="none">
           <a:ln>
@@ -5003,8 +5112,8 @@
           <a:schemeClr val="accent1"/>
         </a:buClr>
         <a:buSzPct val="80000"/>
-        <a:buFontTx/>
-        <a:buChar char=""/>
+        <a:buFont typeface="Trebuchet MS"/>
+        <a:buChar char="u"/>
         <a:tabLst/>
         <a:defRPr b="0" baseline="0" cap="none" i="0" spc="0" strike="noStrike" sz="1800" u="none">
           <a:ln>
@@ -5034,8 +5143,8 @@
           <a:schemeClr val="accent1"/>
         </a:buClr>
         <a:buSzPct val="80000"/>
-        <a:buFontTx/>
-        <a:buChar char=""/>
+        <a:buFont typeface="Trebuchet MS"/>
+        <a:buChar char="u"/>
         <a:tabLst/>
         <a:defRPr b="0" baseline="0" cap="none" i="0" spc="0" strike="noStrike" sz="1800" u="none">
           <a:ln>
@@ -5065,8 +5174,8 @@
           <a:schemeClr val="accent1"/>
         </a:buClr>
         <a:buSzPct val="80000"/>
-        <a:buFontTx/>
-        <a:buChar char=""/>
+        <a:buFont typeface="Trebuchet MS"/>
+        <a:buChar char="u"/>
         <a:tabLst/>
         <a:defRPr b="0" baseline="0" cap="none" i="0" spc="0" strike="noStrike" sz="1800" u="none">
           <a:ln>
@@ -5096,8 +5205,8 @@
           <a:schemeClr val="accent1"/>
         </a:buClr>
         <a:buSzPct val="80000"/>
-        <a:buFontTx/>
-        <a:buChar char=""/>
+        <a:buFont typeface="Trebuchet MS"/>
+        <a:buChar char="u"/>
         <a:tabLst/>
         <a:defRPr b="0" baseline="0" cap="none" i="0" spc="0" strike="noStrike" sz="1800" u="none">
           <a:ln>
@@ -5127,8 +5236,8 @@
           <a:schemeClr val="accent1"/>
         </a:buClr>
         <a:buSzPct val="80000"/>
-        <a:buFontTx/>
-        <a:buChar char=""/>
+        <a:buFont typeface="Trebuchet MS"/>
+        <a:buChar char="u"/>
         <a:tabLst/>
         <a:defRPr b="0" baseline="0" cap="none" i="0" spc="0" strike="noStrike" sz="1800" u="none">
           <a:ln>
@@ -5158,8 +5267,8 @@
           <a:schemeClr val="accent1"/>
         </a:buClr>
         <a:buSzPct val="80000"/>
-        <a:buFontTx/>
-        <a:buChar char=""/>
+        <a:buFont typeface="Trebuchet MS"/>
+        <a:buChar char="u"/>
         <a:tabLst/>
         <a:defRPr b="0" baseline="0" cap="none" i="0" spc="0" strike="noStrike" sz="1800" u="none">
           <a:ln>
@@ -5206,7 +5315,7 @@
           <a:sym typeface="Trebuchet MS"/>
         </a:defRPr>
       </a:lvl1pPr>
-      <a:lvl2pPr marL="0" marR="0" indent="457200" algn="r" defTabSz="457200" rtl="0" latinLnBrk="0">
+      <a:lvl2pPr marL="0" marR="0" indent="0" algn="r" defTabSz="457200" rtl="0" latinLnBrk="0">
         <a:lnSpc>
           <a:spcPct val="100000"/>
         </a:lnSpc>
@@ -5235,7 +5344,7 @@
           <a:sym typeface="Trebuchet MS"/>
         </a:defRPr>
       </a:lvl2pPr>
-      <a:lvl3pPr marL="0" marR="0" indent="914400" algn="r" defTabSz="457200" rtl="0" latinLnBrk="0">
+      <a:lvl3pPr marL="0" marR="0" indent="0" algn="r" defTabSz="457200" rtl="0" latinLnBrk="0">
         <a:lnSpc>
           <a:spcPct val="100000"/>
         </a:lnSpc>
@@ -5264,7 +5373,7 @@
           <a:sym typeface="Trebuchet MS"/>
         </a:defRPr>
       </a:lvl3pPr>
-      <a:lvl4pPr marL="0" marR="0" indent="1371600" algn="r" defTabSz="457200" rtl="0" latinLnBrk="0">
+      <a:lvl4pPr marL="0" marR="0" indent="0" algn="r" defTabSz="457200" rtl="0" latinLnBrk="0">
         <a:lnSpc>
           <a:spcPct val="100000"/>
         </a:lnSpc>
@@ -5293,7 +5402,7 @@
           <a:sym typeface="Trebuchet MS"/>
         </a:defRPr>
       </a:lvl4pPr>
-      <a:lvl5pPr marL="0" marR="0" indent="1828800" algn="r" defTabSz="457200" rtl="0" latinLnBrk="0">
+      <a:lvl5pPr marL="0" marR="0" indent="0" algn="r" defTabSz="457200" rtl="0" latinLnBrk="0">
         <a:lnSpc>
           <a:spcPct val="100000"/>
         </a:lnSpc>
@@ -5322,7 +5431,7 @@
           <a:sym typeface="Trebuchet MS"/>
         </a:defRPr>
       </a:lvl5pPr>
-      <a:lvl6pPr marL="0" marR="0" indent="2286000" algn="r" defTabSz="457200" rtl="0" latinLnBrk="0">
+      <a:lvl6pPr marL="0" marR="0" indent="0" algn="r" defTabSz="457200" rtl="0" latinLnBrk="0">
         <a:lnSpc>
           <a:spcPct val="100000"/>
         </a:lnSpc>
@@ -5351,7 +5460,7 @@
           <a:sym typeface="Trebuchet MS"/>
         </a:defRPr>
       </a:lvl6pPr>
-      <a:lvl7pPr marL="0" marR="0" indent="2743200" algn="r" defTabSz="457200" rtl="0" latinLnBrk="0">
+      <a:lvl7pPr marL="0" marR="0" indent="0" algn="r" defTabSz="457200" rtl="0" latinLnBrk="0">
         <a:lnSpc>
           <a:spcPct val="100000"/>
         </a:lnSpc>
@@ -5380,7 +5489,7 @@
           <a:sym typeface="Trebuchet MS"/>
         </a:defRPr>
       </a:lvl7pPr>
-      <a:lvl8pPr marL="0" marR="0" indent="3200400" algn="r" defTabSz="457200" rtl="0" latinLnBrk="0">
+      <a:lvl8pPr marL="0" marR="0" indent="0" algn="r" defTabSz="457200" rtl="0" latinLnBrk="0">
         <a:lnSpc>
           <a:spcPct val="100000"/>
         </a:lnSpc>
@@ -5409,7 +5518,7 @@
           <a:sym typeface="Trebuchet MS"/>
         </a:defRPr>
       </a:lvl8pPr>
-      <a:lvl9pPr marL="0" marR="0" indent="3657600" algn="r" defTabSz="457200" rtl="0" latinLnBrk="0">
+      <a:lvl9pPr marL="0" marR="0" indent="0" algn="r" defTabSz="457200" rtl="0" latinLnBrk="0">
         <a:lnSpc>
           <a:spcPct val="100000"/>
         </a:lnSpc>
@@ -5471,7 +5580,7 @@
         <p:spPr>
           <a:xfrm>
             <a:off x="1507067" y="2404534"/>
-            <a:ext cx="7766937" cy="1646303"/>
+            <a:ext cx="7766937" cy="1646304"/>
           </a:xfrm>
           <a:prstGeom prst="rect">
             <a:avLst/>
@@ -5480,8 +5589,8 @@
         <p:txBody>
           <a:bodyPr/>
           <a:lstStyle>
-            <a:lvl1pPr defTabSz="443484">
-              <a:defRPr sz="5238"/>
+            <a:lvl1pPr defTabSz="443483">
+              <a:defRPr sz="5200"/>
             </a:lvl1pPr>
           </a:lstStyle>
           <a:p>
@@ -5503,7 +5612,7 @@
         <p:spPr>
           <a:xfrm>
             <a:off x="1507067" y="4395389"/>
-            <a:ext cx="7766937" cy="1096900"/>
+            <a:ext cx="7766937" cy="1096901"/>
           </a:xfrm>
           <a:prstGeom prst="rect">
             <a:avLst/>
@@ -5689,6 +5798,7 @@
           <a:lstStyle/>
           <a:p>
             <a:pPr marL="400050" indent="-400050">
+              <a:buFontTx/>
               <a:buAutoNum type="romanUcPeriod" startAt="1"/>
             </a:pPr>
             <a:r>
@@ -5697,11 +5807,13 @@
           </a:p>
           <a:p>
             <a:pPr marL="400050" indent="-400050">
+              <a:buFontTx/>
               <a:buAutoNum type="romanUcPeriod" startAt="1"/>
             </a:pPr>
           </a:p>
           <a:p>
             <a:pPr marL="400050" indent="-400050">
+              <a:buFontTx/>
               <a:buAutoNum type="romanUcPeriod" startAt="2"/>
             </a:pPr>
             <a:r>
@@ -5710,11 +5822,13 @@
           </a:p>
           <a:p>
             <a:pPr marL="400050" indent="-400050">
+              <a:buFontTx/>
               <a:buAutoNum type="romanUcPeriod" startAt="2"/>
             </a:pPr>
           </a:p>
           <a:p>
             <a:pPr marL="400050" indent="-400050">
+              <a:buFontTx/>
               <a:buAutoNum type="romanUcPeriod" startAt="3"/>
             </a:pPr>
             <a:r>
@@ -5723,11 +5837,13 @@
           </a:p>
           <a:p>
             <a:pPr marL="400050" indent="-400050">
+              <a:buFontTx/>
               <a:buAutoNum type="romanUcPeriod" startAt="3"/>
             </a:pPr>
           </a:p>
           <a:p>
             <a:pPr marL="400050" indent="-400050">
+              <a:buFontTx/>
               <a:buAutoNum type="romanUcPeriod" startAt="4"/>
             </a:pPr>
             <a:r>
@@ -5810,7 +5926,7 @@
         <p:spPr>
           <a:xfrm>
             <a:off x="919253" y="2657867"/>
-            <a:ext cx="3768482" cy="2800074"/>
+            <a:ext cx="3768482" cy="2800075"/>
           </a:xfrm>
           <a:prstGeom prst="rect">
             <a:avLst/>
@@ -5829,7 +5945,7 @@
         <p:spPr>
           <a:xfrm>
             <a:off x="677334" y="1452843"/>
-            <a:ext cx="5592418" cy="358140"/>
+            <a:ext cx="5592418" cy="358139"/>
           </a:xfrm>
           <a:prstGeom prst="rect">
             <a:avLst/>
@@ -5844,7 +5960,7 @@
           </a:extLst>
         </p:spPr>
         <p:txBody>
-          <a:bodyPr lIns="45719" rIns="45719">
+          <a:bodyPr lIns="45718" tIns="45718" rIns="45718" bIns="45718">
             <a:spAutoFit/>
           </a:bodyPr>
           <a:lstStyle/>
@@ -5854,6 +5970,10 @@
                 <a:solidFill>
                   <a:srgbClr val="404040"/>
                 </a:solidFill>
+                <a:latin typeface="+mj-lt"/>
+                <a:ea typeface="+mj-ea"/>
+                <a:cs typeface="+mj-cs"/>
+                <a:sym typeface="Trebuchet MS"/>
               </a:defRPr>
             </a:pPr>
             <a:r>
@@ -5882,7 +6002,7 @@
         <p:spPr>
           <a:xfrm>
             <a:off x="1979282" y="5757443"/>
-            <a:ext cx="1648424" cy="358141"/>
+            <a:ext cx="1648425" cy="358139"/>
           </a:xfrm>
           <a:prstGeom prst="rect">
             <a:avLst/>
@@ -5897,7 +6017,7 @@
           </a:extLst>
         </p:spPr>
         <p:txBody>
-          <a:bodyPr lIns="45719" rIns="45719">
+          <a:bodyPr lIns="45718" tIns="45718" rIns="45718" bIns="45718">
             <a:spAutoFit/>
           </a:bodyPr>
           <a:lstStyle>
@@ -5906,6 +6026,10 @@
                 <a:solidFill>
                   <a:srgbClr val="404040"/>
                 </a:solidFill>
+                <a:latin typeface="+mj-lt"/>
+                <a:ea typeface="+mj-ea"/>
+                <a:cs typeface="+mj-cs"/>
+                <a:sym typeface="Trebuchet MS"/>
               </a:defRPr>
             </a:lvl1pPr>
           </a:lstStyle>
@@ -5926,7 +6050,7 @@
         <p:spPr>
           <a:xfrm>
             <a:off x="5552659" y="5618943"/>
-            <a:ext cx="4007021" cy="624841"/>
+            <a:ext cx="4007022" cy="624839"/>
           </a:xfrm>
           <a:prstGeom prst="rect">
             <a:avLst/>
@@ -5941,7 +6065,7 @@
           </a:extLst>
         </p:spPr>
         <p:txBody>
-          <a:bodyPr lIns="45719" rIns="45719">
+          <a:bodyPr lIns="45718" tIns="45718" rIns="45718" bIns="45718">
             <a:spAutoFit/>
           </a:bodyPr>
           <a:lstStyle/>
@@ -5951,6 +6075,10 @@
                 <a:solidFill>
                   <a:srgbClr val="404040"/>
                 </a:solidFill>
+                <a:latin typeface="+mj-lt"/>
+                <a:ea typeface="+mj-ea"/>
+                <a:cs typeface="+mj-cs"/>
+                <a:sym typeface="Trebuchet MS"/>
               </a:defRPr>
             </a:pPr>
             <a:r>
@@ -5963,6 +6091,10 @@
                 <a:solidFill>
                   <a:srgbClr val="404040"/>
                 </a:solidFill>
+                <a:latin typeface="+mj-lt"/>
+                <a:ea typeface="+mj-ea"/>
+                <a:cs typeface="+mj-cs"/>
+                <a:sym typeface="Trebuchet MS"/>
               </a:defRPr>
             </a:pPr>
             <a:r>
@@ -5990,8 +6122,8 @@
         </p:blipFill>
         <p:spPr>
           <a:xfrm>
-            <a:off x="5500757" y="2657866"/>
-            <a:ext cx="4058924" cy="2812377"/>
+            <a:off x="5500756" y="2657866"/>
+            <a:ext cx="4058925" cy="2812377"/>
           </a:xfrm>
           <a:prstGeom prst="rect">
             <a:avLst/>
@@ -6094,8 +6226,9 @@
             <a:endParaRPr b="1"/>
           </a:p>
           <a:p>
-            <a:pPr/>
-            <a:endParaRPr b="1"/>
+            <a:pPr>
+              <a:defRPr b="1"/>
+            </a:pPr>
           </a:p>
           <a:p>
             <a:pPr/>
@@ -6222,8 +6355,8 @@
         </p:nvSpPr>
         <p:spPr>
           <a:xfrm>
-            <a:off x="2663687" y="3592734"/>
-            <a:ext cx="4956314" cy="624841"/>
+            <a:off x="2663686" y="3592734"/>
+            <a:ext cx="4956316" cy="624839"/>
           </a:xfrm>
           <a:prstGeom prst="rect">
             <a:avLst/>
@@ -6241,7 +6374,7 @@
           </a:extLst>
         </p:spPr>
         <p:txBody>
-          <a:bodyPr lIns="45719" rIns="45719">
+          <a:bodyPr lIns="45718" tIns="45718" rIns="45718" bIns="45718">
             <a:spAutoFit/>
           </a:bodyPr>
           <a:lstStyle>
@@ -6250,6 +6383,10 @@
                 <a:solidFill>
                   <a:srgbClr val="FFFF00"/>
                 </a:solidFill>
+                <a:latin typeface="+mj-lt"/>
+                <a:ea typeface="+mj-ea"/>
+                <a:cs typeface="+mj-cs"/>
+                <a:sym typeface="Trebuchet MS"/>
               </a:defRPr>
             </a:lvl1pPr>
           </a:lstStyle>
@@ -6326,7 +6463,7 @@
         <p:spPr>
           <a:xfrm>
             <a:off x="677333" y="1488612"/>
-            <a:ext cx="8596670" cy="3880774"/>
+            <a:ext cx="8596670" cy="3880775"/>
           </a:xfrm>
           <a:prstGeom prst="rect">
             <a:avLst/>
@@ -6393,8 +6530,8 @@
         </p:blipFill>
         <p:spPr>
           <a:xfrm>
-            <a:off x="2525302" y="3687946"/>
-            <a:ext cx="4900732" cy="2819447"/>
+            <a:off x="2525302" y="3687945"/>
+            <a:ext cx="4900732" cy="2819448"/>
           </a:xfrm>
           <a:prstGeom prst="rect">
             <a:avLst/>
@@ -6449,7 +6586,7 @@
         <p:spPr>
           <a:xfrm>
             <a:off x="335937" y="1501709"/>
-            <a:ext cx="8938066" cy="4521404"/>
+            <a:ext cx="8938067" cy="4521404"/>
           </a:xfrm>
           <a:prstGeom prst="rect">
             <a:avLst/>
@@ -6552,7 +6689,7 @@
         <p:spPr>
           <a:xfrm>
             <a:off x="677333" y="1829284"/>
-            <a:ext cx="8596670" cy="4419117"/>
+            <a:ext cx="8596670" cy="4419118"/>
           </a:xfrm>
           <a:prstGeom prst="rect">
             <a:avLst/>
@@ -6580,8 +6717,9 @@
             <a:endParaRPr b="1"/>
           </a:p>
           <a:p>
-            <a:pPr/>
-            <a:endParaRPr b="1"/>
+            <a:pPr>
+              <a:defRPr b="1"/>
+            </a:pPr>
           </a:p>
           <a:p>
             <a:pPr/>
@@ -6692,8 +6830,8 @@
         </p:nvSpPr>
         <p:spPr>
           <a:xfrm>
-            <a:off x="677333" y="1590259"/>
-            <a:ext cx="9248545" cy="5088837"/>
+            <a:off x="677333" y="1303516"/>
+            <a:ext cx="9803476" cy="5375581"/>
           </a:xfrm>
           <a:prstGeom prst="rect">
             <a:avLst/>
@@ -6729,7 +6867,6 @@
                 <a:spcPct val="90000"/>
               </a:lnSpc>
               <a:buSzTx/>
-              <a:buFont typeface="Wingdings 3"/>
               <a:buNone/>
               <a:defRPr sz="1600"/>
             </a:pPr>
@@ -6768,6 +6905,17 @@
               <a:defRPr sz="1600"/>
             </a:pPr>
             <a:r>
+              <a:t>Remise à l’échelle des deux nuages de points en comparant la distance entre épaule gauche et droite</a:t>
+            </a:r>
+          </a:p>
+          <a:p>
+            <a:pPr lvl="1" marL="742950" indent="-285750">
+              <a:lnSpc>
+                <a:spcPct val="90000"/>
+              </a:lnSpc>
+              <a:defRPr sz="1600"/>
+            </a:pPr>
+            <a:r>
               <a:t>Faire correspondre un même point caractéristique, l’épaule gauche par exemple.  </a:t>
             </a:r>
           </a:p>
@@ -6777,20 +6925,24 @@
                 <a:spcPct val="90000"/>
               </a:lnSpc>
               <a:buSzTx/>
-              <a:buFont typeface="Wingdings 3"/>
               <a:buNone/>
-              <a:defRPr sz="1600"/>
-            </a:pPr>
-            <a:r>
-              <a:rPr>
+              <a:defRPr sz="1600">
                 <a:latin typeface="Wingdings"/>
                 <a:ea typeface="Wingdings"/>
                 <a:cs typeface="Wingdings"/>
                 <a:sym typeface="Wingdings"/>
+              </a:defRPr>
+            </a:pPr>
+            <a:r>
+              <a:t>	</a:t>
+            </a:r>
+            <a:r>
+              <a:rPr>
+                <a:latin typeface="+mj-lt"/>
+                <a:ea typeface="+mj-ea"/>
+                <a:cs typeface="+mj-cs"/>
+                <a:sym typeface="Trebuchet MS"/>
               </a:rPr>
-              <a:t>	</a:t>
-            </a:r>
-            <a:r>
               <a:t> Translation</a:t>
             </a:r>
           </a:p>
@@ -6799,8 +6951,8 @@
               <a:lnSpc>
                 <a:spcPct val="90000"/>
               </a:lnSpc>
+              <a:defRPr sz="1600"/>
             </a:pPr>
-            <a:endParaRPr sz="1600"/>
           </a:p>
           <a:p>
             <a:pPr>
@@ -6984,7 +7136,13 @@
           </a:effectLst>
         </a:effectStyle>
         <a:effectStyle>
-          <a:effectLst/>
+          <a:effectLst>
+            <a:outerShdw sx="100000" sy="100000" kx="0" ky="0" algn="b" rotWithShape="0" blurRad="38100" dist="25400" dir="5400000">
+              <a:srgbClr val="000000">
+                <a:alpha val="35000"/>
+              </a:srgbClr>
+            </a:outerShdw>
+          </a:effectLst>
         </a:effectStyle>
       </a:effectStyleLst>
       <a:bgFillStyleLst>
@@ -7045,7 +7203,7 @@
         <a:solidFill>
           <a:srgbClr val="FFFFFF"/>
         </a:solidFill>
-        <a:ln w="19050" cap="rnd">
+        <a:ln w="25400" cap="flat">
           <a:solidFill>
             <a:schemeClr val="accent1"/>
           </a:solidFill>
@@ -7061,7 +7219,7 @@
         </a:effectLst>
         <a:sp3d/>
       </a:spPr>
-      <a:bodyPr rot="0" spcFirstLastPara="1" vertOverflow="overflow" horzOverflow="overflow" vert="horz" wrap="square" lIns="45719" tIns="45719" rIns="45719" bIns="45719" numCol="1" spcCol="38100" rtlCol="0" anchor="ctr" upright="0">
+      <a:bodyPr rot="0" spcFirstLastPara="1" vertOverflow="overflow" horzOverflow="overflow" vert="horz" wrap="square" lIns="45718" tIns="45718" rIns="45718" bIns="45718" numCol="1" spcCol="38100" rtlCol="0" anchor="ctr" upright="0">
         <a:spAutoFit/>
       </a:bodyPr>
       <a:lstStyle>
@@ -7089,10 +7247,10 @@
             </a:solidFill>
             <a:effectLst/>
             <a:uFillTx/>
-            <a:latin typeface="+mj-lt"/>
-            <a:ea typeface="+mj-ea"/>
-            <a:cs typeface="+mj-cs"/>
-            <a:sym typeface="Trebuchet MS"/>
+            <a:latin typeface="+mn-lt"/>
+            <a:ea typeface="+mn-ea"/>
+            <a:cs typeface="+mn-cs"/>
+            <a:sym typeface="Helvetica"/>
           </a:defRPr>
         </a:defPPr>
         <a:lvl1pPr marL="0" marR="0" indent="0" algn="l" defTabSz="914400" rtl="0" fontAlgn="auto" latinLnBrk="1" hangingPunct="0">
@@ -7340,14 +7498,20 @@
     <a:lnDef>
       <a:spPr>
         <a:noFill/>
-        <a:ln w="19050" cap="rnd">
+        <a:ln w="25400" cap="flat">
           <a:solidFill>
             <a:schemeClr val="accent1"/>
           </a:solidFill>
           <a:prstDash val="solid"/>
           <a:round/>
         </a:ln>
-        <a:effectLst/>
+        <a:effectLst>
+          <a:outerShdw sx="100000" sy="100000" kx="0" ky="0" algn="b" rotWithShape="0" blurRad="38100" dist="25400" dir="5400000">
+            <a:srgbClr val="000000">
+              <a:alpha val="35000"/>
+            </a:srgbClr>
+          </a:outerShdw>
+        </a:effectLst>
         <a:sp3d/>
       </a:spPr>
       <a:bodyPr rot="0" spcFirstLastPara="1" vertOverflow="overflow" horzOverflow="overflow" vert="horz" wrap="square" lIns="91439" tIns="45719" rIns="91439" bIns="45719" numCol="1" spcCol="38100" rtlCol="0" anchor="t" upright="0">
@@ -7632,7 +7796,7 @@
         <a:effectLst/>
         <a:sp3d/>
       </a:spPr>
-      <a:bodyPr rot="0" spcFirstLastPara="1" vertOverflow="overflow" horzOverflow="overflow" vert="horz" wrap="square" lIns="45719" tIns="45719" rIns="45719" bIns="45719" numCol="1" spcCol="38100" rtlCol="0" anchor="t" upright="0">
+      <a:bodyPr rot="0" spcFirstLastPara="1" vertOverflow="overflow" horzOverflow="overflow" vert="horz" wrap="square" lIns="45718" tIns="45718" rIns="45718" bIns="45718" numCol="1" spcCol="38100" rtlCol="0" anchor="t" upright="0">
         <a:spAutoFit/>
       </a:bodyPr>
       <a:lstStyle>
@@ -7660,10 +7824,10 @@
             </a:solidFill>
             <a:effectLst/>
             <a:uFillTx/>
-            <a:latin typeface="+mj-lt"/>
-            <a:ea typeface="+mj-ea"/>
-            <a:cs typeface="+mj-cs"/>
-            <a:sym typeface="Trebuchet MS"/>
+            <a:latin typeface="+mn-lt"/>
+            <a:ea typeface="+mn-ea"/>
+            <a:cs typeface="+mn-cs"/>
+            <a:sym typeface="Helvetica"/>
           </a:defRPr>
         </a:defPPr>
         <a:lvl1pPr marL="0" marR="0" indent="0" algn="l" defTabSz="914400" rtl="0" fontAlgn="auto" latinLnBrk="1" hangingPunct="0">
@@ -8056,7 +8220,13 @@
           </a:effectLst>
         </a:effectStyle>
         <a:effectStyle>
-          <a:effectLst/>
+          <a:effectLst>
+            <a:outerShdw sx="100000" sy="100000" kx="0" ky="0" algn="b" rotWithShape="0" blurRad="38100" dist="25400" dir="5400000">
+              <a:srgbClr val="000000">
+                <a:alpha val="35000"/>
+              </a:srgbClr>
+            </a:outerShdw>
+          </a:effectLst>
         </a:effectStyle>
       </a:effectStyleLst>
       <a:bgFillStyleLst>
@@ -8117,7 +8287,7 @@
         <a:solidFill>
           <a:srgbClr val="FFFFFF"/>
         </a:solidFill>
-        <a:ln w="19050" cap="rnd">
+        <a:ln w="25400" cap="flat">
           <a:solidFill>
             <a:schemeClr val="accent1"/>
           </a:solidFill>
@@ -8133,7 +8303,7 @@
         </a:effectLst>
         <a:sp3d/>
       </a:spPr>
-      <a:bodyPr rot="0" spcFirstLastPara="1" vertOverflow="overflow" horzOverflow="overflow" vert="horz" wrap="square" lIns="45719" tIns="45719" rIns="45719" bIns="45719" numCol="1" spcCol="38100" rtlCol="0" anchor="ctr" upright="0">
+      <a:bodyPr rot="0" spcFirstLastPara="1" vertOverflow="overflow" horzOverflow="overflow" vert="horz" wrap="square" lIns="45718" tIns="45718" rIns="45718" bIns="45718" numCol="1" spcCol="38100" rtlCol="0" anchor="ctr" upright="0">
         <a:spAutoFit/>
       </a:bodyPr>
       <a:lstStyle>
@@ -8161,10 +8331,10 @@
             </a:solidFill>
             <a:effectLst/>
             <a:uFillTx/>
-            <a:latin typeface="+mj-lt"/>
-            <a:ea typeface="+mj-ea"/>
-            <a:cs typeface="+mj-cs"/>
-            <a:sym typeface="Trebuchet MS"/>
+            <a:latin typeface="+mn-lt"/>
+            <a:ea typeface="+mn-ea"/>
+            <a:cs typeface="+mn-cs"/>
+            <a:sym typeface="Helvetica"/>
           </a:defRPr>
         </a:defPPr>
         <a:lvl1pPr marL="0" marR="0" indent="0" algn="l" defTabSz="914400" rtl="0" fontAlgn="auto" latinLnBrk="1" hangingPunct="0">
@@ -8412,14 +8582,20 @@
     <a:lnDef>
       <a:spPr>
         <a:noFill/>
-        <a:ln w="19050" cap="rnd">
+        <a:ln w="25400" cap="flat">
           <a:solidFill>
             <a:schemeClr val="accent1"/>
           </a:solidFill>
           <a:prstDash val="solid"/>
           <a:round/>
         </a:ln>
-        <a:effectLst/>
+        <a:effectLst>
+          <a:outerShdw sx="100000" sy="100000" kx="0" ky="0" algn="b" rotWithShape="0" blurRad="38100" dist="25400" dir="5400000">
+            <a:srgbClr val="000000">
+              <a:alpha val="35000"/>
+            </a:srgbClr>
+          </a:outerShdw>
+        </a:effectLst>
         <a:sp3d/>
       </a:spPr>
       <a:bodyPr rot="0" spcFirstLastPara="1" vertOverflow="overflow" horzOverflow="overflow" vert="horz" wrap="square" lIns="91439" tIns="45719" rIns="91439" bIns="45719" numCol="1" spcCol="38100" rtlCol="0" anchor="t" upright="0">
@@ -8704,7 +8880,7 @@
         <a:effectLst/>
         <a:sp3d/>
       </a:spPr>
-      <a:bodyPr rot="0" spcFirstLastPara="1" vertOverflow="overflow" horzOverflow="overflow" vert="horz" wrap="square" lIns="45719" tIns="45719" rIns="45719" bIns="45719" numCol="1" spcCol="38100" rtlCol="0" anchor="t" upright="0">
+      <a:bodyPr rot="0" spcFirstLastPara="1" vertOverflow="overflow" horzOverflow="overflow" vert="horz" wrap="square" lIns="45718" tIns="45718" rIns="45718" bIns="45718" numCol="1" spcCol="38100" rtlCol="0" anchor="t" upright="0">
         <a:spAutoFit/>
       </a:bodyPr>
       <a:lstStyle>
@@ -8732,10 +8908,10 @@
             </a:solidFill>
             <a:effectLst/>
             <a:uFillTx/>
-            <a:latin typeface="+mj-lt"/>
-            <a:ea typeface="+mj-ea"/>
-            <a:cs typeface="+mj-cs"/>
-            <a:sym typeface="Trebuchet MS"/>
+            <a:latin typeface="+mn-lt"/>
+            <a:ea typeface="+mn-ea"/>
+            <a:cs typeface="+mn-cs"/>
+            <a:sym typeface="Helvetica"/>
           </a:defRPr>
         </a:defPPr>
         <a:lvl1pPr marL="0" marR="0" indent="0" algn="l" defTabSz="914400" rtl="0" fontAlgn="auto" latinLnBrk="1" hangingPunct="0">

</xml_diff>

<commit_message>
Change time fitting graph
</commit_message>
<xml_diff>
--- a/Présentation.pptx
+++ b/Présentation.pptx
@@ -322,6 +322,11 @@
       </a:defRPr>
     </a:lvl9pPr>
   </p:defaultTextStyle>
+  <p:extLst>
+    <p:ext uri="{EFAFB233-063F-42B5-8137-9DF3F51BA10A}">
+      <p15:sldGuideLst xmlns:p15="http://schemas.microsoft.com/office/powerpoint/2012/main"/>
+    </p:ext>
+  </p:extLst>
 </p:presentation>
 </file>
 
@@ -1764,7 +1769,7 @@
           </a:ln>
           <a:extLst>
             <a:ext uri="{C572A759-6A51-4108-AA02-DFA0A04FC94B}">
-              <ma14:wrappingTextBoxFlag xmlns:ma14="http://schemas.microsoft.com/office/mac/drawingml/2011/main" xmlns:a14="http://schemas.microsoft.com/office/drawing/2010/main" xmlns:m="http://schemas.openxmlformats.org/officeDocument/2006/math" xmlns="" val="1"/>
+              <ma14:wrappingTextBoxFlag xmlns="" xmlns:m="http://schemas.openxmlformats.org/officeDocument/2006/math" xmlns:a14="http://schemas.microsoft.com/office/drawing/2010/main" xmlns:ma14="http://schemas.microsoft.com/office/mac/drawingml/2011/main" val="1"/>
             </a:ext>
           </a:extLst>
         </p:spPr>
@@ -1811,7 +1816,7 @@
           </a:ln>
           <a:extLst>
             <a:ext uri="{C572A759-6A51-4108-AA02-DFA0A04FC94B}">
-              <ma14:wrappingTextBoxFlag xmlns:ma14="http://schemas.microsoft.com/office/mac/drawingml/2011/main" xmlns:a14="http://schemas.microsoft.com/office/drawing/2010/main" xmlns:m="http://schemas.openxmlformats.org/officeDocument/2006/math" xmlns="" val="1"/>
+              <ma14:wrappingTextBoxFlag xmlns="" xmlns:m="http://schemas.openxmlformats.org/officeDocument/2006/math" xmlns:a14="http://schemas.microsoft.com/office/drawing/2010/main" xmlns:ma14="http://schemas.microsoft.com/office/mac/drawingml/2011/main" val="1"/>
             </a:ext>
           </a:extLst>
         </p:spPr>
@@ -2228,7 +2233,7 @@
           </a:ln>
           <a:extLst>
             <a:ext uri="{C572A759-6A51-4108-AA02-DFA0A04FC94B}">
-              <ma14:wrappingTextBoxFlag xmlns:ma14="http://schemas.microsoft.com/office/mac/drawingml/2011/main" xmlns:a14="http://schemas.microsoft.com/office/drawing/2010/main" xmlns:m="http://schemas.openxmlformats.org/officeDocument/2006/math" xmlns="" val="1"/>
+              <ma14:wrappingTextBoxFlag xmlns="" xmlns:m="http://schemas.openxmlformats.org/officeDocument/2006/math" xmlns:a14="http://schemas.microsoft.com/office/drawing/2010/main" xmlns:ma14="http://schemas.microsoft.com/office/mac/drawingml/2011/main" val="1"/>
             </a:ext>
           </a:extLst>
         </p:spPr>
@@ -2275,7 +2280,7 @@
           </a:ln>
           <a:extLst>
             <a:ext uri="{C572A759-6A51-4108-AA02-DFA0A04FC94B}">
-              <ma14:wrappingTextBoxFlag xmlns:ma14="http://schemas.microsoft.com/office/mac/drawingml/2011/main" xmlns:a14="http://schemas.microsoft.com/office/drawing/2010/main" xmlns:m="http://schemas.openxmlformats.org/officeDocument/2006/math" xmlns="" val="1"/>
+              <ma14:wrappingTextBoxFlag xmlns="" xmlns:m="http://schemas.openxmlformats.org/officeDocument/2006/math" xmlns:a14="http://schemas.microsoft.com/office/drawing/2010/main" xmlns:ma14="http://schemas.microsoft.com/office/mac/drawingml/2011/main" val="1"/>
             </a:ext>
           </a:extLst>
         </p:spPr>
@@ -4724,7 +4729,7 @@
           </a:ln>
           <a:extLst>
             <a:ext uri="{C572A759-6A51-4108-AA02-DFA0A04FC94B}">
-              <ma14:wrappingTextBoxFlag xmlns:ma14="http://schemas.microsoft.com/office/mac/drawingml/2011/main" xmlns:a14="http://schemas.microsoft.com/office/drawing/2010/main" xmlns:m="http://schemas.openxmlformats.org/officeDocument/2006/math" xmlns="" val="1"/>
+              <ma14:wrappingTextBoxFlag xmlns="" xmlns:m="http://schemas.openxmlformats.org/officeDocument/2006/math" xmlns:a14="http://schemas.microsoft.com/office/drawing/2010/main" xmlns:ma14="http://schemas.microsoft.com/office/mac/drawingml/2011/main" val="1"/>
             </a:ext>
           </a:extLst>
         </p:spPr>
@@ -4763,7 +4768,7 @@
           </a:ln>
           <a:extLst>
             <a:ext uri="{C572A759-6A51-4108-AA02-DFA0A04FC94B}">
-              <ma14:wrappingTextBoxFlag xmlns:ma14="http://schemas.microsoft.com/office/mac/drawingml/2011/main" xmlns:a14="http://schemas.microsoft.com/office/drawing/2010/main" xmlns:m="http://schemas.openxmlformats.org/officeDocument/2006/math" xmlns="" val="1"/>
+              <ma14:wrappingTextBoxFlag xmlns="" xmlns:m="http://schemas.openxmlformats.org/officeDocument/2006/math" xmlns:a14="http://schemas.microsoft.com/office/drawing/2010/main" xmlns:ma14="http://schemas.microsoft.com/office/mac/drawingml/2011/main" val="1"/>
             </a:ext>
           </a:extLst>
         </p:spPr>
@@ -6132,7 +6137,7 @@
           </a:ln>
           <a:extLst>
             <a:ext uri="{C572A759-6A51-4108-AA02-DFA0A04FC94B}">
-              <ma14:wrappingTextBoxFlag xmlns:ma14="http://schemas.microsoft.com/office/mac/drawingml/2011/main" xmlns:a14="http://schemas.microsoft.com/office/drawing/2010/main" xmlns:m="http://schemas.openxmlformats.org/officeDocument/2006/math" xmlns="" val="1"/>
+              <ma14:wrappingTextBoxFlag xmlns="" xmlns:m="http://schemas.openxmlformats.org/officeDocument/2006/math" xmlns:a14="http://schemas.microsoft.com/office/drawing/2010/main" xmlns:ma14="http://schemas.microsoft.com/office/mac/drawingml/2011/main" val="1"/>
             </a:ext>
           </a:extLst>
         </p:spPr>
@@ -6196,7 +6201,7 @@
           </a:ln>
           <a:extLst>
             <a:ext uri="{C572A759-6A51-4108-AA02-DFA0A04FC94B}">
-              <ma14:wrappingTextBoxFlag xmlns:ma14="http://schemas.microsoft.com/office/mac/drawingml/2011/main" xmlns:a14="http://schemas.microsoft.com/office/drawing/2010/main" xmlns:m="http://schemas.openxmlformats.org/officeDocument/2006/math" xmlns="" val="1"/>
+              <ma14:wrappingTextBoxFlag xmlns="" xmlns:m="http://schemas.openxmlformats.org/officeDocument/2006/math" xmlns:a14="http://schemas.microsoft.com/office/drawing/2010/main" xmlns:ma14="http://schemas.microsoft.com/office/mac/drawingml/2011/main" val="1"/>
             </a:ext>
           </a:extLst>
         </p:spPr>
@@ -6878,7 +6883,7 @@
           </a:ln>
           <a:extLst>
             <a:ext uri="{C572A759-6A51-4108-AA02-DFA0A04FC94B}">
-              <ma14:wrappingTextBoxFlag xmlns:ma14="http://schemas.microsoft.com/office/mac/drawingml/2011/main" xmlns:a14="http://schemas.microsoft.com/office/drawing/2010/main" xmlns:m="http://schemas.openxmlformats.org/officeDocument/2006/math" xmlns="" val="1"/>
+              <ma14:wrappingTextBoxFlag xmlns="" xmlns:m="http://schemas.openxmlformats.org/officeDocument/2006/math" xmlns:a14="http://schemas.microsoft.com/office/drawing/2010/main" xmlns:ma14="http://schemas.microsoft.com/office/mac/drawingml/2011/main" val="1"/>
             </a:ext>
           </a:extLst>
         </p:spPr>
@@ -6935,7 +6940,7 @@
           </a:ln>
           <a:extLst>
             <a:ext uri="{C572A759-6A51-4108-AA02-DFA0A04FC94B}">
-              <ma14:wrappingTextBoxFlag xmlns:ma14="http://schemas.microsoft.com/office/mac/drawingml/2011/main" xmlns:a14="http://schemas.microsoft.com/office/drawing/2010/main" xmlns:m="http://schemas.openxmlformats.org/officeDocument/2006/math" xmlns="" val="1"/>
+              <ma14:wrappingTextBoxFlag xmlns="" xmlns:m="http://schemas.openxmlformats.org/officeDocument/2006/math" xmlns:a14="http://schemas.microsoft.com/office/drawing/2010/main" xmlns:ma14="http://schemas.microsoft.com/office/mac/drawingml/2011/main" val="1"/>
             </a:ext>
           </a:extLst>
         </p:spPr>
@@ -6982,7 +6987,7 @@
           </a:ln>
           <a:extLst>
             <a:ext uri="{C572A759-6A51-4108-AA02-DFA0A04FC94B}">
-              <ma14:wrappingTextBoxFlag xmlns:ma14="http://schemas.microsoft.com/office/mac/drawingml/2011/main" xmlns:a14="http://schemas.microsoft.com/office/drawing/2010/main" xmlns:m="http://schemas.openxmlformats.org/officeDocument/2006/math" xmlns="" val="1"/>
+              <ma14:wrappingTextBoxFlag xmlns="" xmlns:m="http://schemas.openxmlformats.org/officeDocument/2006/math" xmlns:a14="http://schemas.microsoft.com/office/drawing/2010/main" xmlns:ma14="http://schemas.microsoft.com/office/mac/drawingml/2011/main" val="1"/>
             </a:ext>
           </a:extLst>
         </p:spPr>
@@ -7574,35 +7579,6 @@
           <a:chExt cx="0" cy="0"/>
         </a:xfrm>
       </p:grpSpPr>
-      <p:pic>
-        <p:nvPicPr>
-          <p:cNvPr id="210" name="Espace réservé du contenu 6" descr="Espace réservé du contenu 6"/>
-          <p:cNvPicPr>
-            <a:picLocks noChangeAspect="1"/>
-          </p:cNvPicPr>
-          <p:nvPr/>
-        </p:nvPicPr>
-        <p:blipFill>
-          <a:blip r:embed="rId2">
-            <a:extLst/>
-          </a:blip>
-          <a:stretch>
-            <a:fillRect/>
-          </a:stretch>
-        </p:blipFill>
-        <p:spPr>
-          <a:xfrm>
-            <a:off x="335937" y="1501709"/>
-            <a:ext cx="8938067" cy="4521404"/>
-          </a:xfrm>
-          <a:prstGeom prst="rect">
-            <a:avLst/>
-          </a:prstGeom>
-          <a:ln w="12700">
-            <a:miter lim="400000"/>
-          </a:ln>
-        </p:spPr>
-      </p:pic>
       <p:sp>
         <p:nvSpPr>
           <p:cNvPr id="211" name="Titre 1"/>
@@ -7632,6 +7608,42 @@
           </a:p>
         </p:txBody>
       </p:sp>
+      <p:pic>
+        <p:nvPicPr>
+          <p:cNvPr id="3" name="Image 2">
+            <a:extLst>
+              <a:ext uri="{FF2B5EF4-FFF2-40B4-BE49-F238E27FC236}">
+                <a16:creationId xmlns:a16="http://schemas.microsoft.com/office/drawing/2014/main" id="{ACE74199-2BA4-4FC5-A6F5-A7D939A3B621}"/>
+              </a:ext>
+            </a:extLst>
+          </p:cNvPr>
+          <p:cNvPicPr>
+            <a:picLocks noChangeAspect="1"/>
+          </p:cNvPicPr>
+          <p:nvPr/>
+        </p:nvPicPr>
+        <p:blipFill>
+          <a:blip r:embed="rId2">
+            <a:extLst>
+              <a:ext uri="{28A0092B-C50C-407E-A947-70E740481C1C}">
+                <a14:useLocalDpi xmlns:a14="http://schemas.microsoft.com/office/drawing/2010/main" val="0"/>
+              </a:ext>
+            </a:extLst>
+          </a:blip>
+          <a:stretch>
+            <a:fillRect/>
+          </a:stretch>
+        </p:blipFill>
+        <p:spPr>
+          <a:xfrm>
+            <a:off x="535711" y="1692420"/>
+            <a:ext cx="9273308" cy="4690989"/>
+          </a:xfrm>
+          <a:prstGeom prst="rect">
+            <a:avLst/>
+          </a:prstGeom>
+        </p:spPr>
+      </p:pic>
     </p:spTree>
   </p:cSld>
   <p:clrMapOvr>

</xml_diff>